<commit_message>
daeil 250911 v1.4 commit
</commit_message>
<xml_diff>
--- a/doc/메인화면 디자인.pptx
+++ b/doc/메인화면 디자인.pptx
@@ -104,6 +104,11 @@
       </a:defRPr>
     </a:lvl9pPr>
   </p:defaultTextStyle>
+  <p:extLst>
+    <p:ext uri="{EFAFB233-063F-42B5-8137-9DF3F51BA10A}">
+      <p15:sldGuideLst xmlns:p15="http://schemas.microsoft.com/office/powerpoint/2012/main"/>
+    </p:ext>
+  </p:extLst>
 </p:presentation>
 </file>
 
@@ -238,7 +243,7 @@
           <a:p>
             <a:fld id="{999221D3-5307-4F2D-ACFD-686254E5945C}" type="datetimeFigureOut">
               <a:rPr lang="ko-KR" altLang="en-US" smtClean="0"/>
-              <a:t>2025-09-05</a:t>
+              <a:t>2025-09-11</a:t>
             </a:fld>
             <a:endParaRPr lang="ko-KR" altLang="en-US"/>
           </a:p>
@@ -408,7 +413,7 @@
           <a:p>
             <a:fld id="{999221D3-5307-4F2D-ACFD-686254E5945C}" type="datetimeFigureOut">
               <a:rPr lang="ko-KR" altLang="en-US" smtClean="0"/>
-              <a:t>2025-09-05</a:t>
+              <a:t>2025-09-11</a:t>
             </a:fld>
             <a:endParaRPr lang="ko-KR" altLang="en-US"/>
           </a:p>
@@ -588,7 +593,7 @@
           <a:p>
             <a:fld id="{999221D3-5307-4F2D-ACFD-686254E5945C}" type="datetimeFigureOut">
               <a:rPr lang="ko-KR" altLang="en-US" smtClean="0"/>
-              <a:t>2025-09-05</a:t>
+              <a:t>2025-09-11</a:t>
             </a:fld>
             <a:endParaRPr lang="ko-KR" altLang="en-US"/>
           </a:p>
@@ -758,7 +763,7 @@
           <a:p>
             <a:fld id="{999221D3-5307-4F2D-ACFD-686254E5945C}" type="datetimeFigureOut">
               <a:rPr lang="ko-KR" altLang="en-US" smtClean="0"/>
-              <a:t>2025-09-05</a:t>
+              <a:t>2025-09-11</a:t>
             </a:fld>
             <a:endParaRPr lang="ko-KR" altLang="en-US"/>
           </a:p>
@@ -1002,7 +1007,7 @@
           <a:p>
             <a:fld id="{999221D3-5307-4F2D-ACFD-686254E5945C}" type="datetimeFigureOut">
               <a:rPr lang="ko-KR" altLang="en-US" smtClean="0"/>
-              <a:t>2025-09-05</a:t>
+              <a:t>2025-09-11</a:t>
             </a:fld>
             <a:endParaRPr lang="ko-KR" altLang="en-US"/>
           </a:p>
@@ -1234,7 +1239,7 @@
           <a:p>
             <a:fld id="{999221D3-5307-4F2D-ACFD-686254E5945C}" type="datetimeFigureOut">
               <a:rPr lang="ko-KR" altLang="en-US" smtClean="0"/>
-              <a:t>2025-09-05</a:t>
+              <a:t>2025-09-11</a:t>
             </a:fld>
             <a:endParaRPr lang="ko-KR" altLang="en-US"/>
           </a:p>
@@ -1601,7 +1606,7 @@
           <a:p>
             <a:fld id="{999221D3-5307-4F2D-ACFD-686254E5945C}" type="datetimeFigureOut">
               <a:rPr lang="ko-KR" altLang="en-US" smtClean="0"/>
-              <a:t>2025-09-05</a:t>
+              <a:t>2025-09-11</a:t>
             </a:fld>
             <a:endParaRPr lang="ko-KR" altLang="en-US"/>
           </a:p>
@@ -1719,7 +1724,7 @@
           <a:p>
             <a:fld id="{999221D3-5307-4F2D-ACFD-686254E5945C}" type="datetimeFigureOut">
               <a:rPr lang="ko-KR" altLang="en-US" smtClean="0"/>
-              <a:t>2025-09-05</a:t>
+              <a:t>2025-09-11</a:t>
             </a:fld>
             <a:endParaRPr lang="ko-KR" altLang="en-US"/>
           </a:p>
@@ -1814,7 +1819,7 @@
           <a:p>
             <a:fld id="{999221D3-5307-4F2D-ACFD-686254E5945C}" type="datetimeFigureOut">
               <a:rPr lang="ko-KR" altLang="en-US" smtClean="0"/>
-              <a:t>2025-09-05</a:t>
+              <a:t>2025-09-11</a:t>
             </a:fld>
             <a:endParaRPr lang="ko-KR" altLang="en-US"/>
           </a:p>
@@ -2091,7 +2096,7 @@
           <a:p>
             <a:fld id="{999221D3-5307-4F2D-ACFD-686254E5945C}" type="datetimeFigureOut">
               <a:rPr lang="ko-KR" altLang="en-US" smtClean="0"/>
-              <a:t>2025-09-05</a:t>
+              <a:t>2025-09-11</a:t>
             </a:fld>
             <a:endParaRPr lang="ko-KR" altLang="en-US"/>
           </a:p>
@@ -2348,7 +2353,7 @@
           <a:p>
             <a:fld id="{999221D3-5307-4F2D-ACFD-686254E5945C}" type="datetimeFigureOut">
               <a:rPr lang="ko-KR" altLang="en-US" smtClean="0"/>
-              <a:t>2025-09-05</a:t>
+              <a:t>2025-09-11</a:t>
             </a:fld>
             <a:endParaRPr lang="ko-KR" altLang="en-US"/>
           </a:p>
@@ -2561,7 +2566,7 @@
           <a:p>
             <a:fld id="{999221D3-5307-4F2D-ACFD-686254E5945C}" type="datetimeFigureOut">
               <a:rPr lang="ko-KR" altLang="en-US" smtClean="0"/>
-              <a:t>2025-09-05</a:t>
+              <a:t>2025-09-11</a:t>
             </a:fld>
             <a:endParaRPr lang="ko-KR" altLang="en-US"/>
           </a:p>
@@ -2966,6 +2971,61 @@
           <a:chExt cx="0" cy="0"/>
         </a:xfrm>
       </p:grpSpPr>
+      <p:sp>
+        <p:nvSpPr>
+          <p:cNvPr id="63" name="모서리가 둥근 직사각형 62"/>
+          <p:cNvSpPr/>
+          <p:nvPr/>
+        </p:nvSpPr>
+        <p:spPr>
+          <a:xfrm>
+            <a:off x="0" y="4204"/>
+            <a:ext cx="9144000" cy="6853795"/>
+          </a:xfrm>
+          <a:prstGeom prst="roundRect">
+            <a:avLst>
+              <a:gd name="adj" fmla="val 0"/>
+            </a:avLst>
+          </a:prstGeom>
+          <a:solidFill>
+            <a:schemeClr val="tx1">
+              <a:lumMod val="65000"/>
+              <a:lumOff val="35000"/>
+            </a:schemeClr>
+          </a:solidFill>
+        </p:spPr>
+        <p:style>
+          <a:lnRef idx="2">
+            <a:schemeClr val="accent1">
+              <a:shade val="50000"/>
+            </a:schemeClr>
+          </a:lnRef>
+          <a:fillRef idx="1">
+            <a:schemeClr val="accent1"/>
+          </a:fillRef>
+          <a:effectRef idx="0">
+            <a:schemeClr val="accent1"/>
+          </a:effectRef>
+          <a:fontRef idx="minor">
+            <a:schemeClr val="lt1"/>
+          </a:fontRef>
+        </p:style>
+        <p:txBody>
+          <a:bodyPr rot="0" spcFirstLastPara="0" vertOverflow="overflow" horzOverflow="overflow" vert="horz" wrap="square" lIns="91440" tIns="45720" rIns="91440" bIns="45720" numCol="1" spcCol="0" rtlCol="0" fromWordArt="0" anchor="ctr" anchorCtr="0" forceAA="0" compatLnSpc="1">
+            <a:prstTxWarp prst="textNoShape">
+              <a:avLst/>
+            </a:prstTxWarp>
+            <a:noAutofit/>
+          </a:bodyPr>
+          <a:lstStyle/>
+          <a:p>
+            <a:pPr algn="ctr"/>
+            <a:endParaRPr lang="ko-KR" altLang="en-US" sz="8000">
+              <a:latin typeface="Consolas" panose="020B0609020204030204" pitchFamily="49" charset="0"/>
+            </a:endParaRPr>
+          </a:p>
+        </p:txBody>
+      </p:sp>
       <p:pic>
         <p:nvPicPr>
           <p:cNvPr id="4" name="그림 3"/>
@@ -2988,7 +3048,7 @@
         </p:blipFill>
         <p:spPr>
           <a:xfrm>
-            <a:off x="28712" y="187811"/>
+            <a:off x="28712" y="22711"/>
             <a:ext cx="7750946" cy="1352550"/>
           </a:xfrm>
           <a:prstGeom prst="rect">
@@ -3004,10 +3064,10 @@
         </p:nvGrpSpPr>
         <p:grpSpPr>
           <a:xfrm>
-            <a:off x="7678669" y="494754"/>
-            <a:ext cx="1588897" cy="769442"/>
-            <a:chOff x="7141640" y="3265714"/>
-            <a:chExt cx="1588897" cy="769442"/>
+            <a:off x="7779658" y="494754"/>
+            <a:ext cx="1386918" cy="769442"/>
+            <a:chOff x="7242629" y="3265714"/>
+            <a:chExt cx="1386918" cy="769442"/>
           </a:xfrm>
         </p:grpSpPr>
         <p:sp>
@@ -3018,8 +3078,8 @@
           </p:nvSpPr>
           <p:spPr>
             <a:xfrm>
-              <a:off x="7141640" y="3265714"/>
-              <a:ext cx="1588897" cy="400110"/>
+              <a:off x="7245835" y="3265714"/>
+              <a:ext cx="1380506" cy="400110"/>
             </a:xfrm>
             <a:prstGeom prst="rect">
               <a:avLst/>
@@ -3034,10 +3094,18 @@
             <a:p>
               <a:pPr algn="ctr"/>
               <a:r>
-                <a:rPr lang="en-US" altLang="ko-KR" sz="2000" b="1"/>
+                <a:rPr lang="en-US" altLang="ko-KR" sz="2000" b="1">
+                  <a:solidFill>
+                    <a:schemeClr val="bg1"/>
+                  </a:solidFill>
+                </a:rPr>
                 <a:t>2025-09-05</a:t>
               </a:r>
-              <a:endParaRPr lang="ko-KR" altLang="en-US" sz="2000" b="1"/>
+              <a:endParaRPr lang="ko-KR" altLang="en-US" sz="2000" b="1">
+                <a:solidFill>
+                  <a:schemeClr val="bg1"/>
+                </a:solidFill>
+              </a:endParaRPr>
             </a:p>
           </p:txBody>
         </p:sp>
@@ -3065,10 +3133,18 @@
             <a:p>
               <a:pPr algn="ctr"/>
               <a:r>
-                <a:rPr lang="en-US" altLang="ko-KR" sz="2000" b="1"/>
+                <a:rPr lang="en-US" altLang="ko-KR" sz="2000" b="1">
+                  <a:solidFill>
+                    <a:schemeClr val="bg1"/>
+                  </a:solidFill>
+                </a:rPr>
                 <a:t>13:50</a:t>
               </a:r>
-              <a:endParaRPr lang="ko-KR" altLang="en-US" sz="2000" b="1"/>
+              <a:endParaRPr lang="ko-KR" altLang="en-US" sz="2000" b="1">
+                <a:solidFill>
+                  <a:schemeClr val="bg1"/>
+                </a:solidFill>
+              </a:endParaRPr>
             </a:p>
           </p:txBody>
         </p:sp>
@@ -3081,8 +3157,8 @@
         </p:nvSpPr>
         <p:spPr>
           <a:xfrm>
-            <a:off x="1209930" y="2701269"/>
-            <a:ext cx="2727070" cy="2148114"/>
+            <a:off x="1245970" y="3508713"/>
+            <a:ext cx="2727070" cy="1938314"/>
           </a:xfrm>
           <a:prstGeom prst="roundRect">
             <a:avLst>
@@ -3136,8 +3212,8 @@
         </p:nvSpPr>
         <p:spPr>
           <a:xfrm>
-            <a:off x="2007228" y="1749770"/>
-            <a:ext cx="1929772" cy="369332"/>
+            <a:off x="1579693" y="2136513"/>
+            <a:ext cx="1910127" cy="369332"/>
           </a:xfrm>
           <a:prstGeom prst="rect">
             <a:avLst/>
@@ -3152,10 +3228,18 @@
           <a:p>
             <a:pPr algn="ctr"/>
             <a:r>
-              <a:rPr lang="en-US" altLang="ko-KR" smtClean="0"/>
+              <a:rPr lang="en-US" altLang="ko-KR" smtClean="0">
+                <a:solidFill>
+                  <a:schemeClr val="bg1"/>
+                </a:solidFill>
+              </a:rPr>
               <a:t>89131CU210</a:t>
             </a:r>
-            <a:endParaRPr lang="en-US" altLang="ko-KR"/>
+            <a:endParaRPr lang="en-US" altLang="ko-KR">
+              <a:solidFill>
+                <a:schemeClr val="bg1"/>
+              </a:solidFill>
+            </a:endParaRPr>
           </a:p>
         </p:txBody>
       </p:sp>
@@ -3167,8 +3251,8 @@
         </p:nvSpPr>
         <p:spPr>
           <a:xfrm>
-            <a:off x="1977573" y="2102085"/>
-            <a:ext cx="1929772" cy="369332"/>
+            <a:off x="1550038" y="2488828"/>
+            <a:ext cx="2636706" cy="369332"/>
           </a:xfrm>
           <a:prstGeom prst="rect">
             <a:avLst/>
@@ -3182,7 +3266,11 @@
           <a:lstStyle/>
           <a:p>
             <a:r>
-              <a:rPr lang="en-US" altLang="ko-KR"/>
+              <a:rPr lang="en-US" altLang="ko-KR">
+                <a:solidFill>
+                  <a:schemeClr val="bg1"/>
+                </a:solidFill>
+              </a:rPr>
               <a:t>TESTETST TEST 0</a:t>
             </a:r>
           </a:p>
@@ -3196,8 +3284,8 @@
         </p:nvSpPr>
         <p:spPr>
           <a:xfrm>
-            <a:off x="148614" y="1540361"/>
-            <a:ext cx="4067785" cy="5038644"/>
+            <a:off x="148614" y="1677964"/>
+            <a:ext cx="4067785" cy="1252693"/>
           </a:xfrm>
           <a:prstGeom prst="roundRect">
             <a:avLst>
@@ -3207,7 +3295,9 @@
           <a:noFill/>
           <a:ln>
             <a:solidFill>
-              <a:srgbClr val="C00000"/>
+              <a:schemeClr val="bg2">
+                <a:lumMod val="90000"/>
+              </a:schemeClr>
             </a:solidFill>
           </a:ln>
         </p:spPr>
@@ -3249,15 +3339,12 @@
         </p:nvSpPr>
         <p:spPr>
           <a:xfrm>
-            <a:off x="413097" y="3050159"/>
+            <a:off x="362404" y="3708462"/>
             <a:ext cx="676931" cy="676931"/>
           </a:xfrm>
           <a:prstGeom prst="ellipse">
             <a:avLst/>
           </a:prstGeom>
-          <a:solidFill>
-            <a:srgbClr val="0070C0"/>
-          </a:solidFill>
         </p:spPr>
         <p:style>
           <a:lnRef idx="2">
@@ -3296,7 +3383,7 @@
         </p:nvSpPr>
         <p:spPr>
           <a:xfrm>
-            <a:off x="413097" y="3829832"/>
+            <a:off x="362404" y="4488135"/>
             <a:ext cx="676931" cy="676931"/>
           </a:xfrm>
           <a:prstGeom prst="ellipse">
@@ -3337,14 +3424,14 @@
       </p:sp>
       <p:sp>
         <p:nvSpPr>
-          <p:cNvPr id="14" name="TextBox 13"/>
+          <p:cNvPr id="15" name="TextBox 14"/>
           <p:cNvSpPr txBox="1"/>
           <p:nvPr/>
         </p:nvSpPr>
         <p:spPr>
           <a:xfrm>
-            <a:off x="245044" y="1731761"/>
-            <a:ext cx="1929772" cy="369332"/>
+            <a:off x="343786" y="2470819"/>
+            <a:ext cx="1109389" cy="369332"/>
           </a:xfrm>
           <a:prstGeom prst="rect">
             <a:avLst/>
@@ -3357,21 +3444,32 @@
           </a:bodyPr>
           <a:lstStyle/>
           <a:p>
-            <a:pPr algn="ctr"/>
-            <a:endParaRPr lang="en-US" altLang="ko-KR"/>
-          </a:p>
-        </p:txBody>
-      </p:sp>
-      <p:sp>
-        <p:nvSpPr>
-          <p:cNvPr id="15" name="TextBox 14"/>
+            <a:r>
+              <a:rPr lang="ko-KR" altLang="en-US" smtClean="0">
+                <a:solidFill>
+                  <a:schemeClr val="bg1"/>
+                </a:solidFill>
+              </a:rPr>
+              <a:t>부품이름</a:t>
+            </a:r>
+            <a:endParaRPr lang="en-US" altLang="ko-KR">
+              <a:solidFill>
+                <a:schemeClr val="bg1"/>
+              </a:solidFill>
+            </a:endParaRPr>
+          </a:p>
+        </p:txBody>
+      </p:sp>
+      <p:sp>
+        <p:nvSpPr>
+          <p:cNvPr id="16" name="TextBox 15"/>
           <p:cNvSpPr txBox="1"/>
           <p:nvPr/>
         </p:nvSpPr>
         <p:spPr>
           <a:xfrm>
-            <a:off x="215389" y="2084076"/>
-            <a:ext cx="1929772" cy="369332"/>
+            <a:off x="309459" y="2107304"/>
+            <a:ext cx="1109389" cy="369332"/>
           </a:xfrm>
           <a:prstGeom prst="rect">
             <a:avLst/>
@@ -3385,9 +3483,2505 @@
           <a:lstStyle/>
           <a:p>
             <a:r>
-              <a:rPr lang="en-US" altLang="ko-KR"/>
+              <a:rPr lang="ko-KR" altLang="en-US" smtClean="0">
+                <a:solidFill>
+                  <a:schemeClr val="bg1"/>
+                </a:solidFill>
+              </a:rPr>
+              <a:t>부품번호</a:t>
+            </a:r>
+            <a:endParaRPr lang="en-US" altLang="ko-KR">
+              <a:solidFill>
+                <a:schemeClr val="bg1"/>
+              </a:solidFill>
+            </a:endParaRPr>
+          </a:p>
+        </p:txBody>
+      </p:sp>
+      <p:sp>
+        <p:nvSpPr>
+          <p:cNvPr id="2" name="타원 1"/>
+          <p:cNvSpPr/>
+          <p:nvPr/>
+        </p:nvSpPr>
+        <p:spPr>
+          <a:xfrm>
+            <a:off x="3519475" y="2159369"/>
+            <a:ext cx="595619" cy="608679"/>
+          </a:xfrm>
+          <a:prstGeom prst="ellipse">
+            <a:avLst/>
+          </a:prstGeom>
+        </p:spPr>
+        <p:style>
+          <a:lnRef idx="2">
+            <a:schemeClr val="accent1">
+              <a:shade val="50000"/>
+            </a:schemeClr>
+          </a:lnRef>
+          <a:fillRef idx="1">
+            <a:schemeClr val="accent1"/>
+          </a:fillRef>
+          <a:effectRef idx="0">
+            <a:schemeClr val="accent1"/>
+          </a:effectRef>
+          <a:fontRef idx="minor">
+            <a:schemeClr val="lt1"/>
+          </a:fontRef>
+        </p:style>
+        <p:txBody>
+          <a:bodyPr rtlCol="0" anchor="ctr"/>
+          <a:lstStyle/>
+          <a:p>
+            <a:pPr algn="ctr"/>
+            <a:r>
+              <a:rPr lang="ko-KR" altLang="en-US" sz="600" smtClean="0"/>
+              <a:t>구분값</a:t>
+            </a:r>
+            <a:endParaRPr lang="ko-KR" altLang="en-US" sz="600"/>
+          </a:p>
+        </p:txBody>
+      </p:sp>
+      <p:sp>
+        <p:nvSpPr>
+          <p:cNvPr id="18" name="TextBox 17"/>
+          <p:cNvSpPr txBox="1"/>
+          <p:nvPr/>
+        </p:nvSpPr>
+        <p:spPr>
+          <a:xfrm>
+            <a:off x="423377" y="-1270962"/>
+            <a:ext cx="3833769" cy="1200329"/>
+          </a:xfrm>
+          <a:prstGeom prst="rect">
+            <a:avLst/>
+          </a:prstGeom>
+        </p:spPr>
+        <p:style>
+          <a:lnRef idx="2">
+            <a:schemeClr val="accent4"/>
+          </a:lnRef>
+          <a:fillRef idx="1">
+            <a:schemeClr val="lt1"/>
+          </a:fillRef>
+          <a:effectRef idx="0">
+            <a:schemeClr val="accent4"/>
+          </a:effectRef>
+          <a:fontRef idx="minor">
+            <a:schemeClr val="dk1"/>
+          </a:fontRef>
+        </p:style>
+        <p:txBody>
+          <a:bodyPr wrap="square" rtlCol="0">
+            <a:spAutoFit/>
+          </a:bodyPr>
+          <a:lstStyle/>
+          <a:p>
+            <a:r>
+              <a:rPr lang="ko-KR" altLang="en-US" smtClean="0"/>
+              <a:t>구분값은 기준정보목록의 </a:t>
+            </a:r>
+            <a:r>
+              <a:rPr lang="en-US" altLang="ko-KR" smtClean="0"/>
+              <a:t>“</a:t>
+            </a:r>
+            <a:r>
+              <a:rPr lang="ko-KR" altLang="en-US" smtClean="0"/>
+              <a:t>구분</a:t>
+            </a:r>
+            <a:r>
+              <a:rPr lang="en-US" altLang="ko-KR" smtClean="0"/>
+              <a:t>”</a:t>
+            </a:r>
+            <a:r>
+              <a:rPr lang="ko-KR" altLang="en-US" smtClean="0"/>
+              <a:t>의 값을 표현해주고 정상적으로 연결되면 파랑</a:t>
+            </a:r>
+            <a:r>
+              <a:rPr lang="en-US" altLang="ko-KR" smtClean="0"/>
+              <a:t>,</a:t>
+            </a:r>
+            <a:r>
+              <a:rPr lang="ko-KR" altLang="en-US" smtClean="0"/>
+              <a:t>연결안되거나 목록에 없는 구분값은 적색으로 표현</a:t>
+            </a:r>
+            <a:endParaRPr lang="ko-KR" altLang="en-US"/>
+          </a:p>
+        </p:txBody>
+      </p:sp>
+      <p:sp>
+        <p:nvSpPr>
+          <p:cNvPr id="19" name="TextBox 18"/>
+          <p:cNvSpPr txBox="1"/>
+          <p:nvPr/>
+        </p:nvSpPr>
+        <p:spPr>
+          <a:xfrm>
+            <a:off x="-4246535" y="3108297"/>
+            <a:ext cx="3833769" cy="1477328"/>
+          </a:xfrm>
+          <a:prstGeom prst="rect">
+            <a:avLst/>
+          </a:prstGeom>
+        </p:spPr>
+        <p:style>
+          <a:lnRef idx="2">
+            <a:schemeClr val="accent4"/>
+          </a:lnRef>
+          <a:fillRef idx="1">
+            <a:schemeClr val="lt1"/>
+          </a:fillRef>
+          <a:effectRef idx="0">
+            <a:schemeClr val="accent4"/>
+          </a:effectRef>
+          <a:fontRef idx="minor">
+            <a:schemeClr val="dk1"/>
+          </a:fontRef>
+        </p:style>
+        <p:txBody>
+          <a:bodyPr wrap="square" rtlCol="0">
+            <a:spAutoFit/>
+          </a:bodyPr>
+          <a:lstStyle/>
+          <a:p>
+            <a:r>
+              <a:rPr lang="ko-KR" altLang="en-US" smtClean="0"/>
+              <a:t>정상</a:t>
+            </a:r>
+            <a:r>
+              <a:rPr lang="en-US" altLang="ko-KR" smtClean="0"/>
+              <a:t>/</a:t>
+            </a:r>
+            <a:r>
+              <a:rPr lang="ko-KR" altLang="en-US" smtClean="0"/>
+              <a:t>오류값은 구분값</a:t>
+            </a:r>
+            <a:r>
+              <a:rPr lang="en-US" altLang="ko-KR" smtClean="0"/>
+              <a:t>,PLC</a:t>
+            </a:r>
+            <a:r>
+              <a:rPr lang="ko-KR" altLang="en-US" smtClean="0"/>
+              <a:t>통신</a:t>
+            </a:r>
+            <a:r>
+              <a:rPr lang="en-US" altLang="ko-KR" smtClean="0"/>
+              <a:t>,</a:t>
+            </a:r>
+            <a:r>
+              <a:rPr lang="ko-KR" altLang="en-US" smtClean="0"/>
+              <a:t>바코드스캐너</a:t>
+            </a:r>
+            <a:r>
+              <a:rPr lang="en-US" altLang="ko-KR" smtClean="0"/>
+              <a:t>,</a:t>
+            </a:r>
+            <a:r>
+              <a:rPr lang="ko-KR" altLang="en-US" smtClean="0"/>
+              <a:t>바코드 프린터등의 장이체서 오류발생시 사용자가 직관적으로 알수 있게 정상</a:t>
+            </a:r>
+            <a:r>
+              <a:rPr lang="en-US" altLang="ko-KR" smtClean="0"/>
+              <a:t>/</a:t>
+            </a:r>
+            <a:r>
+              <a:rPr lang="ko-KR" altLang="en-US" smtClean="0"/>
+              <a:t>오류로 쉽게 파악</a:t>
+            </a:r>
+            <a:endParaRPr lang="en-US" altLang="ko-KR" smtClean="0"/>
+          </a:p>
+          <a:p>
+            <a:r>
+              <a:rPr lang="ko-KR" altLang="en-US" smtClean="0"/>
+              <a:t>예를 들면 불이 들어오면 좋겠지</a:t>
+            </a:r>
+            <a:endParaRPr lang="ko-KR" altLang="en-US"/>
+          </a:p>
+        </p:txBody>
+      </p:sp>
+      <p:sp>
+        <p:nvSpPr>
+          <p:cNvPr id="20" name="TextBox 19"/>
+          <p:cNvSpPr txBox="1"/>
+          <p:nvPr/>
+        </p:nvSpPr>
+        <p:spPr>
+          <a:xfrm>
+            <a:off x="-4293855" y="5195972"/>
+            <a:ext cx="3833769" cy="923330"/>
+          </a:xfrm>
+          <a:prstGeom prst="rect">
+            <a:avLst/>
+          </a:prstGeom>
+        </p:spPr>
+        <p:style>
+          <a:lnRef idx="2">
+            <a:schemeClr val="accent4"/>
+          </a:lnRef>
+          <a:fillRef idx="1">
+            <a:schemeClr val="lt1"/>
+          </a:fillRef>
+          <a:effectRef idx="0">
+            <a:schemeClr val="accent4"/>
+          </a:effectRef>
+          <a:fontRef idx="minor">
+            <a:schemeClr val="dk1"/>
+          </a:fontRef>
+        </p:style>
+        <p:txBody>
+          <a:bodyPr wrap="square" rtlCol="0">
+            <a:spAutoFit/>
+          </a:bodyPr>
+          <a:lstStyle/>
+          <a:p>
+            <a:r>
+              <a:rPr lang="ko-KR" altLang="en-US" smtClean="0"/>
+              <a:t>구분값</a:t>
+            </a:r>
+            <a:r>
+              <a:rPr lang="en-US" altLang="ko-KR" smtClean="0"/>
+              <a:t/>
+            </a:r>
+            <a:br>
+              <a:rPr lang="en-US" altLang="ko-KR" smtClean="0"/>
+            </a:br>
+            <a:r>
+              <a:rPr lang="ko-KR" altLang="en-US" smtClean="0"/>
+              <a:t>해당부품번호</a:t>
+            </a:r>
+            <a:r>
+              <a:rPr lang="en-US" altLang="ko-KR" smtClean="0"/>
+              <a:t>,</a:t>
+            </a:r>
+            <a:r>
+              <a:rPr lang="ko-KR" altLang="en-US" smtClean="0"/>
+              <a:t>부품이름의 당일 생산수량 표현</a:t>
+            </a:r>
+            <a:endParaRPr lang="ko-KR" altLang="en-US"/>
+          </a:p>
+        </p:txBody>
+      </p:sp>
+      <p:sp>
+        <p:nvSpPr>
+          <p:cNvPr id="21" name="모서리가 둥근 직사각형 20"/>
+          <p:cNvSpPr/>
+          <p:nvPr/>
+        </p:nvSpPr>
+        <p:spPr>
+          <a:xfrm>
+            <a:off x="898480" y="1489591"/>
+            <a:ext cx="2727070" cy="502240"/>
+          </a:xfrm>
+          <a:prstGeom prst="roundRect">
+            <a:avLst>
+              <a:gd name="adj" fmla="val 14444"/>
+            </a:avLst>
+          </a:prstGeom>
+          <a:ln>
+            <a:noFill/>
+          </a:ln>
+        </p:spPr>
+        <p:style>
+          <a:lnRef idx="2">
+            <a:schemeClr val="accent2"/>
+          </a:lnRef>
+          <a:fillRef idx="1">
+            <a:schemeClr val="lt1"/>
+          </a:fillRef>
+          <a:effectRef idx="0">
+            <a:schemeClr val="accent2"/>
+          </a:effectRef>
+          <a:fontRef idx="minor">
+            <a:schemeClr val="dk1"/>
+          </a:fontRef>
+        </p:style>
+        <p:txBody>
+          <a:bodyPr rot="0" spcFirstLastPara="0" vertOverflow="overflow" horzOverflow="overflow" vert="horz" wrap="square" lIns="91440" tIns="45720" rIns="91440" bIns="45720" numCol="1" spcCol="0" rtlCol="0" fromWordArt="0" anchor="ctr" anchorCtr="0" forceAA="0" compatLnSpc="1">
+            <a:prstTxWarp prst="textNoShape">
+              <a:avLst/>
+            </a:prstTxWarp>
+            <a:noAutofit/>
+          </a:bodyPr>
+          <a:lstStyle/>
+          <a:p>
+            <a:pPr algn="ctr"/>
+            <a:r>
+              <a:rPr lang="en-US" altLang="ko-KR" smtClean="0">
+                <a:latin typeface="Consolas" panose="020B0609020204030204" pitchFamily="49" charset="0"/>
+              </a:rPr>
+              <a:t>FRONT / LH</a:t>
+            </a:r>
+            <a:endParaRPr lang="ko-KR" altLang="en-US">
+              <a:latin typeface="Consolas" panose="020B0609020204030204" pitchFamily="49" charset="0"/>
+            </a:endParaRPr>
+          </a:p>
+        </p:txBody>
+      </p:sp>
+      <p:sp>
+        <p:nvSpPr>
+          <p:cNvPr id="22" name="모서리가 둥근 직사각형 21"/>
+          <p:cNvSpPr/>
+          <p:nvPr/>
+        </p:nvSpPr>
+        <p:spPr>
+          <a:xfrm>
+            <a:off x="148613" y="3204840"/>
+            <a:ext cx="4067785" cy="2357424"/>
+          </a:xfrm>
+          <a:prstGeom prst="roundRect">
+            <a:avLst>
+              <a:gd name="adj" fmla="val 1649"/>
+            </a:avLst>
+          </a:prstGeom>
+          <a:noFill/>
+          <a:ln>
+            <a:solidFill>
+              <a:schemeClr val="bg2">
+                <a:lumMod val="90000"/>
+              </a:schemeClr>
+            </a:solidFill>
+          </a:ln>
+        </p:spPr>
+        <p:style>
+          <a:lnRef idx="2">
+            <a:schemeClr val="accent1">
+              <a:shade val="50000"/>
+            </a:schemeClr>
+          </a:lnRef>
+          <a:fillRef idx="1">
+            <a:schemeClr val="accent1"/>
+          </a:fillRef>
+          <a:effectRef idx="0">
+            <a:schemeClr val="accent1"/>
+          </a:effectRef>
+          <a:fontRef idx="minor">
+            <a:schemeClr val="lt1"/>
+          </a:fontRef>
+        </p:style>
+        <p:txBody>
+          <a:bodyPr rot="0" spcFirstLastPara="0" vertOverflow="overflow" horzOverflow="overflow" vert="horz" wrap="square" lIns="91440" tIns="45720" rIns="91440" bIns="45720" numCol="1" spcCol="0" rtlCol="0" fromWordArt="0" anchor="ctr" anchorCtr="0" forceAA="0" compatLnSpc="1">
+            <a:prstTxWarp prst="textNoShape">
+              <a:avLst/>
+            </a:prstTxWarp>
+            <a:noAutofit/>
+          </a:bodyPr>
+          <a:lstStyle/>
+          <a:p>
+            <a:pPr algn="ctr"/>
+            <a:endParaRPr lang="ko-KR" altLang="en-US" sz="7200"/>
+          </a:p>
+        </p:txBody>
+      </p:sp>
+      <p:sp>
+        <p:nvSpPr>
+          <p:cNvPr id="23" name="모서리가 둥근 직사각형 22"/>
+          <p:cNvSpPr/>
+          <p:nvPr/>
+        </p:nvSpPr>
+        <p:spPr>
+          <a:xfrm>
+            <a:off x="898480" y="3066906"/>
+            <a:ext cx="2727070" cy="341973"/>
+          </a:xfrm>
+          <a:prstGeom prst="roundRect">
+            <a:avLst>
+              <a:gd name="adj" fmla="val 14444"/>
+            </a:avLst>
+          </a:prstGeom>
+          <a:ln>
+            <a:noFill/>
+          </a:ln>
+        </p:spPr>
+        <p:style>
+          <a:lnRef idx="2">
+            <a:schemeClr val="accent5"/>
+          </a:lnRef>
+          <a:fillRef idx="1">
+            <a:schemeClr val="lt1"/>
+          </a:fillRef>
+          <a:effectRef idx="0">
+            <a:schemeClr val="accent5"/>
+          </a:effectRef>
+          <a:fontRef idx="minor">
+            <a:schemeClr val="dk1"/>
+          </a:fontRef>
+        </p:style>
+        <p:txBody>
+          <a:bodyPr rot="0" spcFirstLastPara="0" vertOverflow="overflow" horzOverflow="overflow" vert="horz" wrap="square" lIns="91440" tIns="45720" rIns="91440" bIns="45720" numCol="1" spcCol="0" rtlCol="0" fromWordArt="0" anchor="ctr" anchorCtr="0" forceAA="0" compatLnSpc="1">
+            <a:prstTxWarp prst="textNoShape">
+              <a:avLst/>
+            </a:prstTxWarp>
+            <a:noAutofit/>
+          </a:bodyPr>
+          <a:lstStyle/>
+          <a:p>
+            <a:pPr algn="ctr"/>
+            <a:r>
+              <a:rPr lang="ko-KR" altLang="en-US" smtClean="0">
+                <a:latin typeface="Consolas" panose="020B0609020204030204" pitchFamily="49" charset="0"/>
+              </a:rPr>
+              <a:t>생산수량</a:t>
+            </a:r>
+            <a:endParaRPr lang="ko-KR" altLang="en-US">
+              <a:latin typeface="Consolas" panose="020B0609020204030204" pitchFamily="49" charset="0"/>
+            </a:endParaRPr>
+          </a:p>
+        </p:txBody>
+      </p:sp>
+      <p:sp>
+        <p:nvSpPr>
+          <p:cNvPr id="24" name="모서리가 둥근 직사각형 23"/>
+          <p:cNvSpPr/>
+          <p:nvPr/>
+        </p:nvSpPr>
+        <p:spPr>
+          <a:xfrm>
+            <a:off x="1255312" y="5980208"/>
+            <a:ext cx="2727069" cy="649545"/>
+          </a:xfrm>
+          <a:prstGeom prst="roundRect">
+            <a:avLst>
+              <a:gd name="adj" fmla="val 4422"/>
+            </a:avLst>
+          </a:prstGeom>
+        </p:spPr>
+        <p:style>
+          <a:lnRef idx="2">
+            <a:schemeClr val="accent4">
+              <a:shade val="50000"/>
+            </a:schemeClr>
+          </a:lnRef>
+          <a:fillRef idx="1">
+            <a:schemeClr val="accent4"/>
+          </a:fillRef>
+          <a:effectRef idx="0">
+            <a:schemeClr val="accent4"/>
+          </a:effectRef>
+          <a:fontRef idx="minor">
+            <a:schemeClr val="lt1"/>
+          </a:fontRef>
+        </p:style>
+        <p:txBody>
+          <a:bodyPr rot="0" spcFirstLastPara="0" vertOverflow="overflow" horzOverflow="overflow" vert="horz" wrap="square" lIns="91440" tIns="45720" rIns="91440" bIns="45720" numCol="1" spcCol="0" rtlCol="0" fromWordArt="0" anchor="ctr" anchorCtr="0" forceAA="0" compatLnSpc="1">
+            <a:prstTxWarp prst="textNoShape">
+              <a:avLst/>
+            </a:prstTxWarp>
+            <a:noAutofit/>
+          </a:bodyPr>
+          <a:lstStyle/>
+          <a:p>
+            <a:pPr algn="ctr"/>
+            <a:r>
+              <a:rPr lang="en-US" altLang="ko-KR" sz="6000" smtClean="0">
+                <a:latin typeface="Consolas" panose="020B0609020204030204" pitchFamily="49" charset="0"/>
+              </a:rPr>
+              <a:t>00000</a:t>
+            </a:r>
+            <a:endParaRPr lang="ko-KR" altLang="en-US" sz="6000">
+              <a:latin typeface="Consolas" panose="020B0609020204030204" pitchFamily="49" charset="0"/>
+            </a:endParaRPr>
+          </a:p>
+        </p:txBody>
+      </p:sp>
+      <p:sp>
+        <p:nvSpPr>
+          <p:cNvPr id="25" name="모서리가 둥근 직사각형 24"/>
+          <p:cNvSpPr/>
+          <p:nvPr/>
+        </p:nvSpPr>
+        <p:spPr>
+          <a:xfrm>
+            <a:off x="289052" y="6053860"/>
+            <a:ext cx="732243" cy="502240"/>
+          </a:xfrm>
+          <a:prstGeom prst="roundRect">
+            <a:avLst>
+              <a:gd name="adj" fmla="val 14444"/>
+            </a:avLst>
+          </a:prstGeom>
+          <a:ln/>
+        </p:spPr>
+        <p:style>
+          <a:lnRef idx="2">
+            <a:schemeClr val="accent5"/>
+          </a:lnRef>
+          <a:fillRef idx="1">
+            <a:schemeClr val="lt1"/>
+          </a:fillRef>
+          <a:effectRef idx="0">
+            <a:schemeClr val="accent5"/>
+          </a:effectRef>
+          <a:fontRef idx="minor">
+            <a:schemeClr val="dk1"/>
+          </a:fontRef>
+        </p:style>
+        <p:txBody>
+          <a:bodyPr rot="0" spcFirstLastPara="0" vertOverflow="overflow" horzOverflow="overflow" vert="horz" wrap="square" lIns="91440" tIns="45720" rIns="91440" bIns="45720" numCol="1" spcCol="0" rtlCol="0" fromWordArt="0" anchor="ctr" anchorCtr="0" forceAA="0" compatLnSpc="1">
+            <a:prstTxWarp prst="textNoShape">
+              <a:avLst/>
+            </a:prstTxWarp>
+            <a:noAutofit/>
+          </a:bodyPr>
+          <a:lstStyle/>
+          <a:p>
+            <a:pPr algn="ctr"/>
+            <a:r>
+              <a:rPr lang="ko-KR" altLang="en-US" sz="1400" smtClean="0">
+                <a:latin typeface="Consolas" panose="020B0609020204030204" pitchFamily="49" charset="0"/>
+              </a:rPr>
+              <a:t>누적수량</a:t>
+            </a:r>
+            <a:endParaRPr lang="ko-KR" altLang="en-US" sz="1400">
+              <a:latin typeface="Consolas" panose="020B0609020204030204" pitchFamily="49" charset="0"/>
+            </a:endParaRPr>
+          </a:p>
+        </p:txBody>
+      </p:sp>
+      <p:sp>
+        <p:nvSpPr>
+          <p:cNvPr id="27" name="TextBox 26"/>
+          <p:cNvSpPr txBox="1"/>
+          <p:nvPr/>
+        </p:nvSpPr>
+        <p:spPr>
+          <a:xfrm>
+            <a:off x="9723695" y="-635724"/>
+            <a:ext cx="3833769" cy="2862322"/>
+          </a:xfrm>
+          <a:prstGeom prst="rect">
+            <a:avLst/>
+          </a:prstGeom>
+        </p:spPr>
+        <p:style>
+          <a:lnRef idx="2">
+            <a:schemeClr val="accent4"/>
+          </a:lnRef>
+          <a:fillRef idx="1">
+            <a:schemeClr val="lt1"/>
+          </a:fillRef>
+          <a:effectRef idx="0">
+            <a:schemeClr val="accent4"/>
+          </a:effectRef>
+          <a:fontRef idx="minor">
+            <a:schemeClr val="dk1"/>
+          </a:fontRef>
+        </p:style>
+        <p:txBody>
+          <a:bodyPr wrap="square" rtlCol="0">
+            <a:spAutoFit/>
+          </a:bodyPr>
+          <a:lstStyle/>
+          <a:p>
+            <a:r>
+              <a:rPr lang="ko-KR" altLang="en-US" smtClean="0"/>
+              <a:t>해당공정</a:t>
+            </a:r>
+            <a:r>
+              <a:rPr lang="en-US" altLang="ko-KR" smtClean="0"/>
+              <a:t/>
+            </a:r>
+            <a:br>
+              <a:rPr lang="en-US" altLang="ko-KR" smtClean="0"/>
+            </a:br>
+            <a:r>
+              <a:rPr lang="ko-KR" altLang="en-US" smtClean="0"/>
+              <a:t>부품번호에 하위부품등록시 바코드 스캔해서 부품번호 동일시 상태가 </a:t>
+            </a:r>
+            <a:r>
+              <a:rPr lang="en-US" altLang="ko-KR" smtClean="0"/>
+              <a:t>OK</a:t>
+            </a:r>
+            <a:r>
+              <a:rPr lang="ko-KR" altLang="en-US" smtClean="0"/>
+              <a:t>로변경</a:t>
+            </a:r>
+            <a:endParaRPr lang="en-US" altLang="ko-KR" smtClean="0"/>
+          </a:p>
+          <a:p>
+            <a:r>
+              <a:rPr lang="en-US" altLang="ko-KR" smtClean="0"/>
+              <a:t>-</a:t>
+            </a:r>
+            <a:r>
+              <a:rPr lang="ko-KR" altLang="en-US" smtClean="0"/>
+              <a:t>추가 </a:t>
+            </a:r>
+            <a:endParaRPr lang="en-US" altLang="ko-KR" smtClean="0"/>
+          </a:p>
+          <a:p>
+            <a:r>
+              <a:rPr lang="ko-KR" altLang="en-US" smtClean="0"/>
+              <a:t>하위부품번호 </a:t>
+            </a:r>
+            <a:r>
+              <a:rPr lang="en-US" altLang="ko-KR" smtClean="0"/>
+              <a:t>HKMC</a:t>
+            </a:r>
+            <a:r>
+              <a:rPr lang="ko-KR" altLang="en-US" smtClean="0"/>
+              <a:t>규격으로 입력됨</a:t>
+            </a:r>
+            <a:endParaRPr lang="en-US" altLang="ko-KR" smtClean="0"/>
+          </a:p>
+          <a:p>
+            <a:r>
+              <a:rPr lang="ko-KR" altLang="en-US" smtClean="0"/>
+              <a:t>하위부품번호인지확인도 하지만 추적번호도 확인해서 중복입력방지</a:t>
+            </a:r>
+            <a:r>
+              <a:rPr lang="en-US" altLang="ko-KR" smtClean="0"/>
+              <a:t/>
+            </a:r>
+            <a:br>
+              <a:rPr lang="en-US" altLang="ko-KR" smtClean="0"/>
+            </a:br>
+            <a:endParaRPr lang="ko-KR" altLang="en-US"/>
+          </a:p>
+        </p:txBody>
+      </p:sp>
+      <p:sp>
+        <p:nvSpPr>
+          <p:cNvPr id="28" name="모서리가 둥근 직사각형 27"/>
+          <p:cNvSpPr/>
+          <p:nvPr/>
+        </p:nvSpPr>
+        <p:spPr>
+          <a:xfrm>
+            <a:off x="148612" y="5743769"/>
+            <a:ext cx="4067785" cy="1050731"/>
+          </a:xfrm>
+          <a:prstGeom prst="roundRect">
+            <a:avLst>
+              <a:gd name="adj" fmla="val 1649"/>
+            </a:avLst>
+          </a:prstGeom>
+          <a:noFill/>
+          <a:ln>
+            <a:solidFill>
+              <a:schemeClr val="bg2">
+                <a:lumMod val="90000"/>
+              </a:schemeClr>
+            </a:solidFill>
+          </a:ln>
+        </p:spPr>
+        <p:style>
+          <a:lnRef idx="2">
+            <a:schemeClr val="accent1">
+              <a:shade val="50000"/>
+            </a:schemeClr>
+          </a:lnRef>
+          <a:fillRef idx="1">
+            <a:schemeClr val="accent1"/>
+          </a:fillRef>
+          <a:effectRef idx="0">
+            <a:schemeClr val="accent1"/>
+          </a:effectRef>
+          <a:fontRef idx="minor">
+            <a:schemeClr val="lt1"/>
+          </a:fontRef>
+        </p:style>
+        <p:txBody>
+          <a:bodyPr rot="0" spcFirstLastPara="0" vertOverflow="overflow" horzOverflow="overflow" vert="horz" wrap="square" lIns="91440" tIns="45720" rIns="91440" bIns="45720" numCol="1" spcCol="0" rtlCol="0" fromWordArt="0" anchor="ctr" anchorCtr="0" forceAA="0" compatLnSpc="1">
+            <a:prstTxWarp prst="textNoShape">
+              <a:avLst/>
+            </a:prstTxWarp>
+            <a:noAutofit/>
+          </a:bodyPr>
+          <a:lstStyle/>
+          <a:p>
+            <a:pPr algn="ctr"/>
+            <a:endParaRPr lang="ko-KR" altLang="en-US" sz="7200"/>
+          </a:p>
+        </p:txBody>
+      </p:sp>
+      <p:sp>
+        <p:nvSpPr>
+          <p:cNvPr id="29" name="모서리가 둥근 직사각형 28"/>
+          <p:cNvSpPr/>
+          <p:nvPr/>
+        </p:nvSpPr>
+        <p:spPr>
+          <a:xfrm>
+            <a:off x="5948860" y="3464277"/>
+            <a:ext cx="2727070" cy="1938314"/>
+          </a:xfrm>
+          <a:prstGeom prst="roundRect">
+            <a:avLst>
+              <a:gd name="adj" fmla="val 4422"/>
+            </a:avLst>
+          </a:prstGeom>
+        </p:spPr>
+        <p:style>
+          <a:lnRef idx="2">
+            <a:schemeClr val="accent1">
+              <a:shade val="50000"/>
+            </a:schemeClr>
+          </a:lnRef>
+          <a:fillRef idx="1">
+            <a:schemeClr val="accent1"/>
+          </a:fillRef>
+          <a:effectRef idx="0">
+            <a:schemeClr val="accent1"/>
+          </a:effectRef>
+          <a:fontRef idx="minor">
+            <a:schemeClr val="lt1"/>
+          </a:fontRef>
+        </p:style>
+        <p:txBody>
+          <a:bodyPr rot="0" spcFirstLastPara="0" vertOverflow="overflow" horzOverflow="overflow" vert="horz" wrap="square" lIns="91440" tIns="45720" rIns="91440" bIns="45720" numCol="1" spcCol="0" rtlCol="0" fromWordArt="0" anchor="ctr" anchorCtr="0" forceAA="0" compatLnSpc="1">
+            <a:prstTxWarp prst="textNoShape">
+              <a:avLst/>
+            </a:prstTxWarp>
+            <a:noAutofit/>
+          </a:bodyPr>
+          <a:lstStyle/>
+          <a:p>
+            <a:pPr algn="ctr"/>
+            <a:r>
+              <a:rPr lang="en-US" altLang="ko-KR" sz="8000" smtClean="0">
+                <a:latin typeface="Consolas" panose="020B0609020204030204" pitchFamily="49" charset="0"/>
+              </a:rPr>
+              <a:t>0000</a:t>
+            </a:r>
+            <a:endParaRPr lang="ko-KR" altLang="en-US" sz="8000">
+              <a:latin typeface="Consolas" panose="020B0609020204030204" pitchFamily="49" charset="0"/>
+            </a:endParaRPr>
+          </a:p>
+        </p:txBody>
+      </p:sp>
+      <p:sp>
+        <p:nvSpPr>
+          <p:cNvPr id="30" name="TextBox 29"/>
+          <p:cNvSpPr txBox="1"/>
+          <p:nvPr/>
+        </p:nvSpPr>
+        <p:spPr>
+          <a:xfrm>
+            <a:off x="6282583" y="2092077"/>
+            <a:ext cx="1910127" cy="369332"/>
+          </a:xfrm>
+          <a:prstGeom prst="rect">
+            <a:avLst/>
+          </a:prstGeom>
+          <a:noFill/>
+        </p:spPr>
+        <p:txBody>
+          <a:bodyPr wrap="square" rtlCol="0">
+            <a:spAutoFit/>
+          </a:bodyPr>
+          <a:lstStyle/>
+          <a:p>
+            <a:pPr algn="ctr"/>
+            <a:r>
+              <a:rPr lang="en-US" altLang="ko-KR" smtClean="0">
+                <a:solidFill>
+                  <a:schemeClr val="bg1"/>
+                </a:solidFill>
+              </a:rPr>
+              <a:t>89231CU210</a:t>
+            </a:r>
+            <a:endParaRPr lang="en-US" altLang="ko-KR">
+              <a:solidFill>
+                <a:schemeClr val="bg1"/>
+              </a:solidFill>
+            </a:endParaRPr>
+          </a:p>
+        </p:txBody>
+      </p:sp>
+      <p:sp>
+        <p:nvSpPr>
+          <p:cNvPr id="31" name="TextBox 30"/>
+          <p:cNvSpPr txBox="1"/>
+          <p:nvPr/>
+        </p:nvSpPr>
+        <p:spPr>
+          <a:xfrm>
+            <a:off x="6252928" y="2444392"/>
+            <a:ext cx="2636706" cy="369332"/>
+          </a:xfrm>
+          <a:prstGeom prst="rect">
+            <a:avLst/>
+          </a:prstGeom>
+          <a:noFill/>
+        </p:spPr>
+        <p:txBody>
+          <a:bodyPr wrap="square" rtlCol="0">
+            <a:spAutoFit/>
+          </a:bodyPr>
+          <a:lstStyle/>
+          <a:p>
+            <a:r>
+              <a:rPr lang="en-US" altLang="ko-KR">
+                <a:solidFill>
+                  <a:schemeClr val="bg1"/>
+                </a:solidFill>
+              </a:rPr>
               <a:t>TESTETST TEST 0</a:t>
             </a:r>
+          </a:p>
+        </p:txBody>
+      </p:sp>
+      <p:sp>
+        <p:nvSpPr>
+          <p:cNvPr id="32" name="모서리가 둥근 직사각형 31"/>
+          <p:cNvSpPr/>
+          <p:nvPr/>
+        </p:nvSpPr>
+        <p:spPr>
+          <a:xfrm>
+            <a:off x="4851504" y="1633528"/>
+            <a:ext cx="4067785" cy="1252693"/>
+          </a:xfrm>
+          <a:prstGeom prst="roundRect">
+            <a:avLst>
+              <a:gd name="adj" fmla="val 1649"/>
+            </a:avLst>
+          </a:prstGeom>
+          <a:noFill/>
+          <a:ln>
+            <a:solidFill>
+              <a:schemeClr val="bg2">
+                <a:lumMod val="90000"/>
+              </a:schemeClr>
+            </a:solidFill>
+          </a:ln>
+        </p:spPr>
+        <p:style>
+          <a:lnRef idx="2">
+            <a:schemeClr val="accent1">
+              <a:shade val="50000"/>
+            </a:schemeClr>
+          </a:lnRef>
+          <a:fillRef idx="1">
+            <a:schemeClr val="accent1"/>
+          </a:fillRef>
+          <a:effectRef idx="0">
+            <a:schemeClr val="accent1"/>
+          </a:effectRef>
+          <a:fontRef idx="minor">
+            <a:schemeClr val="lt1"/>
+          </a:fontRef>
+        </p:style>
+        <p:txBody>
+          <a:bodyPr rot="0" spcFirstLastPara="0" vertOverflow="overflow" horzOverflow="overflow" vert="horz" wrap="square" lIns="91440" tIns="45720" rIns="91440" bIns="45720" numCol="1" spcCol="0" rtlCol="0" fromWordArt="0" anchor="ctr" anchorCtr="0" forceAA="0" compatLnSpc="1">
+            <a:prstTxWarp prst="textNoShape">
+              <a:avLst/>
+            </a:prstTxWarp>
+            <a:noAutofit/>
+          </a:bodyPr>
+          <a:lstStyle/>
+          <a:p>
+            <a:pPr algn="ctr"/>
+            <a:endParaRPr lang="ko-KR" altLang="en-US" sz="7200"/>
+          </a:p>
+        </p:txBody>
+      </p:sp>
+      <p:sp>
+        <p:nvSpPr>
+          <p:cNvPr id="33" name="타원 32"/>
+          <p:cNvSpPr/>
+          <p:nvPr/>
+        </p:nvSpPr>
+        <p:spPr>
+          <a:xfrm>
+            <a:off x="5065294" y="3664026"/>
+            <a:ext cx="676931" cy="676931"/>
+          </a:xfrm>
+          <a:prstGeom prst="ellipse">
+            <a:avLst/>
+          </a:prstGeom>
+        </p:spPr>
+        <p:style>
+          <a:lnRef idx="2">
+            <a:schemeClr val="accent1">
+              <a:shade val="50000"/>
+            </a:schemeClr>
+          </a:lnRef>
+          <a:fillRef idx="1">
+            <a:schemeClr val="accent1"/>
+          </a:fillRef>
+          <a:effectRef idx="0">
+            <a:schemeClr val="accent1"/>
+          </a:effectRef>
+          <a:fontRef idx="minor">
+            <a:schemeClr val="lt1"/>
+          </a:fontRef>
+        </p:style>
+        <p:txBody>
+          <a:bodyPr rtlCol="0" anchor="ctr"/>
+          <a:lstStyle/>
+          <a:p>
+            <a:pPr algn="ctr"/>
+            <a:r>
+              <a:rPr lang="ko-KR" altLang="en-US" smtClean="0"/>
+              <a:t>정상</a:t>
+            </a:r>
+            <a:endParaRPr lang="ko-KR" altLang="en-US"/>
+          </a:p>
+        </p:txBody>
+      </p:sp>
+      <p:sp>
+        <p:nvSpPr>
+          <p:cNvPr id="34" name="타원 33"/>
+          <p:cNvSpPr/>
+          <p:nvPr/>
+        </p:nvSpPr>
+        <p:spPr>
+          <a:xfrm>
+            <a:off x="5065294" y="4443699"/>
+            <a:ext cx="676931" cy="676931"/>
+          </a:xfrm>
+          <a:prstGeom prst="ellipse">
+            <a:avLst/>
+          </a:prstGeom>
+          <a:solidFill>
+            <a:srgbClr val="C00000"/>
+          </a:solidFill>
+        </p:spPr>
+        <p:style>
+          <a:lnRef idx="2">
+            <a:schemeClr val="accent1">
+              <a:shade val="50000"/>
+            </a:schemeClr>
+          </a:lnRef>
+          <a:fillRef idx="1">
+            <a:schemeClr val="accent1"/>
+          </a:fillRef>
+          <a:effectRef idx="0">
+            <a:schemeClr val="accent1"/>
+          </a:effectRef>
+          <a:fontRef idx="minor">
+            <a:schemeClr val="lt1"/>
+          </a:fontRef>
+        </p:style>
+        <p:txBody>
+          <a:bodyPr rtlCol="0" anchor="ctr"/>
+          <a:lstStyle/>
+          <a:p>
+            <a:pPr algn="ctr"/>
+            <a:r>
+              <a:rPr lang="ko-KR" altLang="en-US" smtClean="0"/>
+              <a:t>오류</a:t>
+            </a:r>
+            <a:endParaRPr lang="ko-KR" altLang="en-US"/>
+          </a:p>
+        </p:txBody>
+      </p:sp>
+      <p:sp>
+        <p:nvSpPr>
+          <p:cNvPr id="35" name="TextBox 34"/>
+          <p:cNvSpPr txBox="1"/>
+          <p:nvPr/>
+        </p:nvSpPr>
+        <p:spPr>
+          <a:xfrm>
+            <a:off x="5046676" y="2426383"/>
+            <a:ext cx="1109389" cy="369332"/>
+          </a:xfrm>
+          <a:prstGeom prst="rect">
+            <a:avLst/>
+          </a:prstGeom>
+          <a:noFill/>
+        </p:spPr>
+        <p:txBody>
+          <a:bodyPr wrap="square" rtlCol="0">
+            <a:spAutoFit/>
+          </a:bodyPr>
+          <a:lstStyle/>
+          <a:p>
+            <a:r>
+              <a:rPr lang="ko-KR" altLang="en-US" smtClean="0">
+                <a:solidFill>
+                  <a:schemeClr val="bg1"/>
+                </a:solidFill>
+              </a:rPr>
+              <a:t>부품이름</a:t>
+            </a:r>
+            <a:endParaRPr lang="en-US" altLang="ko-KR">
+              <a:solidFill>
+                <a:schemeClr val="bg1"/>
+              </a:solidFill>
+            </a:endParaRPr>
+          </a:p>
+        </p:txBody>
+      </p:sp>
+      <p:sp>
+        <p:nvSpPr>
+          <p:cNvPr id="36" name="TextBox 35"/>
+          <p:cNvSpPr txBox="1"/>
+          <p:nvPr/>
+        </p:nvSpPr>
+        <p:spPr>
+          <a:xfrm>
+            <a:off x="5012349" y="2062868"/>
+            <a:ext cx="1109389" cy="369332"/>
+          </a:xfrm>
+          <a:prstGeom prst="rect">
+            <a:avLst/>
+          </a:prstGeom>
+          <a:noFill/>
+        </p:spPr>
+        <p:txBody>
+          <a:bodyPr wrap="square" rtlCol="0">
+            <a:spAutoFit/>
+          </a:bodyPr>
+          <a:lstStyle/>
+          <a:p>
+            <a:r>
+              <a:rPr lang="ko-KR" altLang="en-US" smtClean="0">
+                <a:solidFill>
+                  <a:schemeClr val="bg1"/>
+                </a:solidFill>
+              </a:rPr>
+              <a:t>부품번호</a:t>
+            </a:r>
+            <a:endParaRPr lang="en-US" altLang="ko-KR">
+              <a:solidFill>
+                <a:schemeClr val="bg1"/>
+              </a:solidFill>
+            </a:endParaRPr>
+          </a:p>
+        </p:txBody>
+      </p:sp>
+      <p:sp>
+        <p:nvSpPr>
+          <p:cNvPr id="37" name="타원 36"/>
+          <p:cNvSpPr/>
+          <p:nvPr/>
+        </p:nvSpPr>
+        <p:spPr>
+          <a:xfrm>
+            <a:off x="8222365" y="2114933"/>
+            <a:ext cx="595619" cy="608679"/>
+          </a:xfrm>
+          <a:prstGeom prst="ellipse">
+            <a:avLst/>
+          </a:prstGeom>
+        </p:spPr>
+        <p:style>
+          <a:lnRef idx="2">
+            <a:schemeClr val="accent1">
+              <a:shade val="50000"/>
+            </a:schemeClr>
+          </a:lnRef>
+          <a:fillRef idx="1">
+            <a:schemeClr val="accent1"/>
+          </a:fillRef>
+          <a:effectRef idx="0">
+            <a:schemeClr val="accent1"/>
+          </a:effectRef>
+          <a:fontRef idx="minor">
+            <a:schemeClr val="lt1"/>
+          </a:fontRef>
+        </p:style>
+        <p:txBody>
+          <a:bodyPr rtlCol="0" anchor="ctr"/>
+          <a:lstStyle/>
+          <a:p>
+            <a:pPr algn="ctr"/>
+            <a:r>
+              <a:rPr lang="ko-KR" altLang="en-US" sz="600" smtClean="0"/>
+              <a:t>구분값</a:t>
+            </a:r>
+            <a:endParaRPr lang="ko-KR" altLang="en-US" sz="600"/>
+          </a:p>
+        </p:txBody>
+      </p:sp>
+      <p:sp>
+        <p:nvSpPr>
+          <p:cNvPr id="38" name="모서리가 둥근 직사각형 37"/>
+          <p:cNvSpPr/>
+          <p:nvPr/>
+        </p:nvSpPr>
+        <p:spPr>
+          <a:xfrm>
+            <a:off x="5601370" y="1445155"/>
+            <a:ext cx="2727070" cy="502240"/>
+          </a:xfrm>
+          <a:prstGeom prst="roundRect">
+            <a:avLst>
+              <a:gd name="adj" fmla="val 14444"/>
+            </a:avLst>
+          </a:prstGeom>
+          <a:ln>
+            <a:noFill/>
+          </a:ln>
+        </p:spPr>
+        <p:style>
+          <a:lnRef idx="2">
+            <a:schemeClr val="accent2"/>
+          </a:lnRef>
+          <a:fillRef idx="1">
+            <a:schemeClr val="lt1"/>
+          </a:fillRef>
+          <a:effectRef idx="0">
+            <a:schemeClr val="accent2"/>
+          </a:effectRef>
+          <a:fontRef idx="minor">
+            <a:schemeClr val="dk1"/>
+          </a:fontRef>
+        </p:style>
+        <p:txBody>
+          <a:bodyPr rot="0" spcFirstLastPara="0" vertOverflow="overflow" horzOverflow="overflow" vert="horz" wrap="square" lIns="91440" tIns="45720" rIns="91440" bIns="45720" numCol="1" spcCol="0" rtlCol="0" fromWordArt="0" anchor="ctr" anchorCtr="0" forceAA="0" compatLnSpc="1">
+            <a:prstTxWarp prst="textNoShape">
+              <a:avLst/>
+            </a:prstTxWarp>
+            <a:noAutofit/>
+          </a:bodyPr>
+          <a:lstStyle/>
+          <a:p>
+            <a:pPr algn="ctr"/>
+            <a:r>
+              <a:rPr lang="en-US" altLang="ko-KR" smtClean="0">
+                <a:latin typeface="Consolas" panose="020B0609020204030204" pitchFamily="49" charset="0"/>
+              </a:rPr>
+              <a:t>REAR / RH</a:t>
+            </a:r>
+            <a:endParaRPr lang="ko-KR" altLang="en-US">
+              <a:latin typeface="Consolas" panose="020B0609020204030204" pitchFamily="49" charset="0"/>
+            </a:endParaRPr>
+          </a:p>
+        </p:txBody>
+      </p:sp>
+      <p:sp>
+        <p:nvSpPr>
+          <p:cNvPr id="39" name="모서리가 둥근 직사각형 38"/>
+          <p:cNvSpPr/>
+          <p:nvPr/>
+        </p:nvSpPr>
+        <p:spPr>
+          <a:xfrm>
+            <a:off x="4851503" y="3160404"/>
+            <a:ext cx="4067785" cy="2357424"/>
+          </a:xfrm>
+          <a:prstGeom prst="roundRect">
+            <a:avLst>
+              <a:gd name="adj" fmla="val 1649"/>
+            </a:avLst>
+          </a:prstGeom>
+          <a:noFill/>
+          <a:ln>
+            <a:solidFill>
+              <a:schemeClr val="bg2">
+                <a:lumMod val="90000"/>
+              </a:schemeClr>
+            </a:solidFill>
+          </a:ln>
+        </p:spPr>
+        <p:style>
+          <a:lnRef idx="2">
+            <a:schemeClr val="accent1">
+              <a:shade val="50000"/>
+            </a:schemeClr>
+          </a:lnRef>
+          <a:fillRef idx="1">
+            <a:schemeClr val="accent1"/>
+          </a:fillRef>
+          <a:effectRef idx="0">
+            <a:schemeClr val="accent1"/>
+          </a:effectRef>
+          <a:fontRef idx="minor">
+            <a:schemeClr val="lt1"/>
+          </a:fontRef>
+        </p:style>
+        <p:txBody>
+          <a:bodyPr rot="0" spcFirstLastPara="0" vertOverflow="overflow" horzOverflow="overflow" vert="horz" wrap="square" lIns="91440" tIns="45720" rIns="91440" bIns="45720" numCol="1" spcCol="0" rtlCol="0" fromWordArt="0" anchor="ctr" anchorCtr="0" forceAA="0" compatLnSpc="1">
+            <a:prstTxWarp prst="textNoShape">
+              <a:avLst/>
+            </a:prstTxWarp>
+            <a:noAutofit/>
+          </a:bodyPr>
+          <a:lstStyle/>
+          <a:p>
+            <a:pPr algn="ctr"/>
+            <a:endParaRPr lang="ko-KR" altLang="en-US" sz="7200"/>
+          </a:p>
+        </p:txBody>
+      </p:sp>
+      <p:sp>
+        <p:nvSpPr>
+          <p:cNvPr id="40" name="모서리가 둥근 직사각형 39"/>
+          <p:cNvSpPr/>
+          <p:nvPr/>
+        </p:nvSpPr>
+        <p:spPr>
+          <a:xfrm>
+            <a:off x="5601370" y="3022470"/>
+            <a:ext cx="2727070" cy="341973"/>
+          </a:xfrm>
+          <a:prstGeom prst="roundRect">
+            <a:avLst>
+              <a:gd name="adj" fmla="val 14444"/>
+            </a:avLst>
+          </a:prstGeom>
+          <a:ln>
+            <a:noFill/>
+          </a:ln>
+        </p:spPr>
+        <p:style>
+          <a:lnRef idx="2">
+            <a:schemeClr val="accent5"/>
+          </a:lnRef>
+          <a:fillRef idx="1">
+            <a:schemeClr val="lt1"/>
+          </a:fillRef>
+          <a:effectRef idx="0">
+            <a:schemeClr val="accent5"/>
+          </a:effectRef>
+          <a:fontRef idx="minor">
+            <a:schemeClr val="dk1"/>
+          </a:fontRef>
+        </p:style>
+        <p:txBody>
+          <a:bodyPr rot="0" spcFirstLastPara="0" vertOverflow="overflow" horzOverflow="overflow" vert="horz" wrap="square" lIns="91440" tIns="45720" rIns="91440" bIns="45720" numCol="1" spcCol="0" rtlCol="0" fromWordArt="0" anchor="ctr" anchorCtr="0" forceAA="0" compatLnSpc="1">
+            <a:prstTxWarp prst="textNoShape">
+              <a:avLst/>
+            </a:prstTxWarp>
+            <a:noAutofit/>
+          </a:bodyPr>
+          <a:lstStyle/>
+          <a:p>
+            <a:pPr algn="ctr"/>
+            <a:r>
+              <a:rPr lang="ko-KR" altLang="en-US" smtClean="0">
+                <a:latin typeface="Consolas" panose="020B0609020204030204" pitchFamily="49" charset="0"/>
+              </a:rPr>
+              <a:t>생산수량</a:t>
+            </a:r>
+            <a:endParaRPr lang="ko-KR" altLang="en-US">
+              <a:latin typeface="Consolas" panose="020B0609020204030204" pitchFamily="49" charset="0"/>
+            </a:endParaRPr>
+          </a:p>
+        </p:txBody>
+      </p:sp>
+      <p:sp>
+        <p:nvSpPr>
+          <p:cNvPr id="41" name="모서리가 둥근 직사각형 40"/>
+          <p:cNvSpPr/>
+          <p:nvPr/>
+        </p:nvSpPr>
+        <p:spPr>
+          <a:xfrm>
+            <a:off x="5958202" y="5935772"/>
+            <a:ext cx="2727069" cy="649545"/>
+          </a:xfrm>
+          <a:prstGeom prst="roundRect">
+            <a:avLst>
+              <a:gd name="adj" fmla="val 4422"/>
+            </a:avLst>
+          </a:prstGeom>
+        </p:spPr>
+        <p:style>
+          <a:lnRef idx="2">
+            <a:schemeClr val="accent4">
+              <a:shade val="50000"/>
+            </a:schemeClr>
+          </a:lnRef>
+          <a:fillRef idx="1">
+            <a:schemeClr val="accent4"/>
+          </a:fillRef>
+          <a:effectRef idx="0">
+            <a:schemeClr val="accent4"/>
+          </a:effectRef>
+          <a:fontRef idx="minor">
+            <a:schemeClr val="lt1"/>
+          </a:fontRef>
+        </p:style>
+        <p:txBody>
+          <a:bodyPr rot="0" spcFirstLastPara="0" vertOverflow="overflow" horzOverflow="overflow" vert="horz" wrap="square" lIns="91440" tIns="45720" rIns="91440" bIns="45720" numCol="1" spcCol="0" rtlCol="0" fromWordArt="0" anchor="ctr" anchorCtr="0" forceAA="0" compatLnSpc="1">
+            <a:prstTxWarp prst="textNoShape">
+              <a:avLst/>
+            </a:prstTxWarp>
+            <a:noAutofit/>
+          </a:bodyPr>
+          <a:lstStyle/>
+          <a:p>
+            <a:pPr algn="ctr"/>
+            <a:r>
+              <a:rPr lang="en-US" altLang="ko-KR" sz="6000" smtClean="0">
+                <a:latin typeface="Consolas" panose="020B0609020204030204" pitchFamily="49" charset="0"/>
+              </a:rPr>
+              <a:t>00000</a:t>
+            </a:r>
+            <a:endParaRPr lang="ko-KR" altLang="en-US" sz="6000">
+              <a:latin typeface="Consolas" panose="020B0609020204030204" pitchFamily="49" charset="0"/>
+            </a:endParaRPr>
+          </a:p>
+        </p:txBody>
+      </p:sp>
+      <p:sp>
+        <p:nvSpPr>
+          <p:cNvPr id="42" name="모서리가 둥근 직사각형 41"/>
+          <p:cNvSpPr/>
+          <p:nvPr/>
+        </p:nvSpPr>
+        <p:spPr>
+          <a:xfrm>
+            <a:off x="4991942" y="6009424"/>
+            <a:ext cx="732243" cy="502240"/>
+          </a:xfrm>
+          <a:prstGeom prst="roundRect">
+            <a:avLst>
+              <a:gd name="adj" fmla="val 14444"/>
+            </a:avLst>
+          </a:prstGeom>
+          <a:ln/>
+        </p:spPr>
+        <p:style>
+          <a:lnRef idx="2">
+            <a:schemeClr val="accent5"/>
+          </a:lnRef>
+          <a:fillRef idx="1">
+            <a:schemeClr val="lt1"/>
+          </a:fillRef>
+          <a:effectRef idx="0">
+            <a:schemeClr val="accent5"/>
+          </a:effectRef>
+          <a:fontRef idx="minor">
+            <a:schemeClr val="dk1"/>
+          </a:fontRef>
+        </p:style>
+        <p:txBody>
+          <a:bodyPr rot="0" spcFirstLastPara="0" vertOverflow="overflow" horzOverflow="overflow" vert="horz" wrap="square" lIns="91440" tIns="45720" rIns="91440" bIns="45720" numCol="1" spcCol="0" rtlCol="0" fromWordArt="0" anchor="ctr" anchorCtr="0" forceAA="0" compatLnSpc="1">
+            <a:prstTxWarp prst="textNoShape">
+              <a:avLst/>
+            </a:prstTxWarp>
+            <a:noAutofit/>
+          </a:bodyPr>
+          <a:lstStyle/>
+          <a:p>
+            <a:pPr algn="ctr"/>
+            <a:r>
+              <a:rPr lang="ko-KR" altLang="en-US" sz="1400" smtClean="0">
+                <a:latin typeface="Consolas" panose="020B0609020204030204" pitchFamily="49" charset="0"/>
+              </a:rPr>
+              <a:t>누적수량</a:t>
+            </a:r>
+            <a:endParaRPr lang="ko-KR" altLang="en-US" sz="1400">
+              <a:latin typeface="Consolas" panose="020B0609020204030204" pitchFamily="49" charset="0"/>
+            </a:endParaRPr>
+          </a:p>
+        </p:txBody>
+      </p:sp>
+      <p:sp>
+        <p:nvSpPr>
+          <p:cNvPr id="43" name="모서리가 둥근 직사각형 42"/>
+          <p:cNvSpPr/>
+          <p:nvPr/>
+        </p:nvSpPr>
+        <p:spPr>
+          <a:xfrm>
+            <a:off x="4851502" y="5699333"/>
+            <a:ext cx="4067785" cy="1050731"/>
+          </a:xfrm>
+          <a:prstGeom prst="roundRect">
+            <a:avLst>
+              <a:gd name="adj" fmla="val 1649"/>
+            </a:avLst>
+          </a:prstGeom>
+          <a:noFill/>
+          <a:ln>
+            <a:solidFill>
+              <a:schemeClr val="bg2">
+                <a:lumMod val="90000"/>
+              </a:schemeClr>
+            </a:solidFill>
+          </a:ln>
+        </p:spPr>
+        <p:style>
+          <a:lnRef idx="2">
+            <a:schemeClr val="accent1">
+              <a:shade val="50000"/>
+            </a:schemeClr>
+          </a:lnRef>
+          <a:fillRef idx="1">
+            <a:schemeClr val="accent1"/>
+          </a:fillRef>
+          <a:effectRef idx="0">
+            <a:schemeClr val="accent1"/>
+          </a:effectRef>
+          <a:fontRef idx="minor">
+            <a:schemeClr val="lt1"/>
+          </a:fontRef>
+        </p:style>
+        <p:txBody>
+          <a:bodyPr rot="0" spcFirstLastPara="0" vertOverflow="overflow" horzOverflow="overflow" vert="horz" wrap="square" lIns="91440" tIns="45720" rIns="91440" bIns="45720" numCol="1" spcCol="0" rtlCol="0" fromWordArt="0" anchor="ctr" anchorCtr="0" forceAA="0" compatLnSpc="1">
+            <a:prstTxWarp prst="textNoShape">
+              <a:avLst/>
+            </a:prstTxWarp>
+            <a:noAutofit/>
+          </a:bodyPr>
+          <a:lstStyle/>
+          <a:p>
+            <a:pPr algn="ctr"/>
+            <a:endParaRPr lang="ko-KR" altLang="en-US" sz="7200"/>
+          </a:p>
+        </p:txBody>
+      </p:sp>
+      <p:graphicFrame>
+        <p:nvGraphicFramePr>
+          <p:cNvPr id="26" name="표 25"/>
+          <p:cNvGraphicFramePr>
+            <a:graphicFrameLocks noGrp="1"/>
+          </p:cNvGraphicFramePr>
+          <p:nvPr>
+            <p:extLst>
+              <p:ext uri="{D42A27DB-BD31-4B8C-83A1-F6EECF244321}">
+                <p14:modId xmlns:p14="http://schemas.microsoft.com/office/powerpoint/2010/main" val="1367195594"/>
+              </p:ext>
+            </p:extLst>
+          </p:nvPr>
+        </p:nvGraphicFramePr>
+        <p:xfrm>
+          <a:off x="9443415" y="2482620"/>
+          <a:ext cx="4515785" cy="2225040"/>
+        </p:xfrm>
+        <a:graphic>
+          <a:graphicData uri="http://schemas.openxmlformats.org/drawingml/2006/table">
+            <a:tbl>
+              <a:tblPr firstRow="1" bandRow="1">
+                <a:tableStyleId>{5C22544A-7EE6-4342-B048-85BDC9FD1C3A}</a:tableStyleId>
+              </a:tblPr>
+              <a:tblGrid>
+                <a:gridCol w="673357">
+                  <a:extLst>
+                    <a:ext uri="{9D8B030D-6E8A-4147-A177-3AD203B41FA5}">
+                      <a16:colId xmlns:a16="http://schemas.microsoft.com/office/drawing/2014/main" val="127911321"/>
+                    </a:ext>
+                  </a:extLst>
+                </a:gridCol>
+                <a:gridCol w="3842428">
+                  <a:extLst>
+                    <a:ext uri="{9D8B030D-6E8A-4147-A177-3AD203B41FA5}">
+                      <a16:colId xmlns:a16="http://schemas.microsoft.com/office/drawing/2014/main" val="2899907802"/>
+                    </a:ext>
+                  </a:extLst>
+                </a:gridCol>
+              </a:tblGrid>
+              <a:tr h="370840">
+                <a:tc>
+                  <a:txBody>
+                    <a:bodyPr/>
+                    <a:lstStyle/>
+                    <a:p>
+                      <a:pPr latinLnBrk="1"/>
+                      <a:r>
+                        <a:rPr lang="ko-KR" altLang="en-US" baseline="0" smtClean="0"/>
+                        <a:t>상태</a:t>
+                      </a:r>
+                      <a:endParaRPr lang="ko-KR" altLang="en-US"/>
+                    </a:p>
+                  </a:txBody>
+                  <a:tcPr/>
+                </a:tc>
+                <a:tc>
+                  <a:txBody>
+                    <a:bodyPr/>
+                    <a:lstStyle/>
+                    <a:p>
+                      <a:pPr algn="ctr" latinLnBrk="1"/>
+                      <a:r>
+                        <a:rPr lang="ko-KR" altLang="en-US" smtClean="0"/>
+                        <a:t>부품번호 스캔</a:t>
+                      </a:r>
+                      <a:endParaRPr lang="ko-KR" altLang="en-US"/>
+                    </a:p>
+                  </a:txBody>
+                  <a:tcPr/>
+                </a:tc>
+                <a:extLst>
+                  <a:ext uri="{0D108BD9-81ED-4DB2-BD59-A6C34878D82A}">
+                    <a16:rowId xmlns:a16="http://schemas.microsoft.com/office/drawing/2014/main" val="3264318289"/>
+                  </a:ext>
+                </a:extLst>
+              </a:tr>
+              <a:tr h="370840">
+                <a:tc>
+                  <a:txBody>
+                    <a:bodyPr/>
+                    <a:lstStyle/>
+                    <a:p>
+                      <a:pPr latinLnBrk="1"/>
+                      <a:endParaRPr lang="ko-KR" altLang="en-US"/>
+                    </a:p>
+                  </a:txBody>
+                  <a:tcPr/>
+                </a:tc>
+                <a:tc>
+                  <a:txBody>
+                    <a:bodyPr/>
+                    <a:lstStyle/>
+                    <a:p>
+                      <a:pPr latinLnBrk="1"/>
+                      <a:r>
+                        <a:rPr lang="en-US" altLang="ko-KR" smtClean="0"/>
+                        <a:t>111111111</a:t>
+                      </a:r>
+                      <a:endParaRPr lang="ko-KR" altLang="en-US"/>
+                    </a:p>
+                  </a:txBody>
+                  <a:tcPr/>
+                </a:tc>
+                <a:extLst>
+                  <a:ext uri="{0D108BD9-81ED-4DB2-BD59-A6C34878D82A}">
+                    <a16:rowId xmlns:a16="http://schemas.microsoft.com/office/drawing/2014/main" val="3863173087"/>
+                  </a:ext>
+                </a:extLst>
+              </a:tr>
+              <a:tr h="370840">
+                <a:tc>
+                  <a:txBody>
+                    <a:bodyPr/>
+                    <a:lstStyle/>
+                    <a:p>
+                      <a:pPr marL="0" marR="0" indent="0" algn="l" defTabSz="914400" rtl="0" eaLnBrk="1" fontAlgn="auto" latinLnBrk="1" hangingPunct="1">
+                        <a:lnSpc>
+                          <a:spcPct val="100000"/>
+                        </a:lnSpc>
+                        <a:spcBef>
+                          <a:spcPts val="0"/>
+                        </a:spcBef>
+                        <a:spcAft>
+                          <a:spcPts val="0"/>
+                        </a:spcAft>
+                        <a:buClrTx/>
+                        <a:buSzTx/>
+                        <a:buFontTx/>
+                        <a:buNone/>
+                        <a:tabLst/>
+                        <a:defRPr/>
+                      </a:pPr>
+                      <a:endParaRPr lang="ko-KR" altLang="en-US"/>
+                    </a:p>
+                  </a:txBody>
+                  <a:tcPr/>
+                </a:tc>
+                <a:tc>
+                  <a:txBody>
+                    <a:bodyPr/>
+                    <a:lstStyle/>
+                    <a:p>
+                      <a:pPr latinLnBrk="1"/>
+                      <a:r>
+                        <a:rPr lang="en-US" altLang="ko-KR" smtClean="0"/>
+                        <a:t>2223333333</a:t>
+                      </a:r>
+                      <a:endParaRPr lang="ko-KR" altLang="en-US"/>
+                    </a:p>
+                  </a:txBody>
+                  <a:tcPr/>
+                </a:tc>
+                <a:extLst>
+                  <a:ext uri="{0D108BD9-81ED-4DB2-BD59-A6C34878D82A}">
+                    <a16:rowId xmlns:a16="http://schemas.microsoft.com/office/drawing/2014/main" val="2707015699"/>
+                  </a:ext>
+                </a:extLst>
+              </a:tr>
+              <a:tr h="370840">
+                <a:tc>
+                  <a:txBody>
+                    <a:bodyPr/>
+                    <a:lstStyle/>
+                    <a:p>
+                      <a:pPr marL="0" marR="0" indent="0" algn="l" defTabSz="914400" rtl="0" eaLnBrk="1" fontAlgn="auto" latinLnBrk="1" hangingPunct="1">
+                        <a:lnSpc>
+                          <a:spcPct val="100000"/>
+                        </a:lnSpc>
+                        <a:spcBef>
+                          <a:spcPts val="0"/>
+                        </a:spcBef>
+                        <a:spcAft>
+                          <a:spcPts val="0"/>
+                        </a:spcAft>
+                        <a:buClrTx/>
+                        <a:buSzTx/>
+                        <a:buFontTx/>
+                        <a:buNone/>
+                        <a:tabLst/>
+                        <a:defRPr/>
+                      </a:pPr>
+                      <a:endParaRPr lang="ko-KR" altLang="en-US" smtClean="0"/>
+                    </a:p>
+                  </a:txBody>
+                  <a:tcPr/>
+                </a:tc>
+                <a:tc>
+                  <a:txBody>
+                    <a:bodyPr/>
+                    <a:lstStyle/>
+                    <a:p>
+                      <a:pPr latinLnBrk="1"/>
+                      <a:r>
+                        <a:rPr lang="en-US" altLang="ko-KR" smtClean="0"/>
+                        <a:t>444444444</a:t>
+                      </a:r>
+                      <a:endParaRPr lang="ko-KR" altLang="en-US"/>
+                    </a:p>
+                  </a:txBody>
+                  <a:tcPr/>
+                </a:tc>
+                <a:extLst>
+                  <a:ext uri="{0D108BD9-81ED-4DB2-BD59-A6C34878D82A}">
+                    <a16:rowId xmlns:a16="http://schemas.microsoft.com/office/drawing/2014/main" val="2590946867"/>
+                  </a:ext>
+                </a:extLst>
+              </a:tr>
+              <a:tr h="370840">
+                <a:tc>
+                  <a:txBody>
+                    <a:bodyPr/>
+                    <a:lstStyle/>
+                    <a:p>
+                      <a:pPr marL="0" marR="0" indent="0" algn="l" defTabSz="914400" rtl="0" eaLnBrk="1" fontAlgn="auto" latinLnBrk="1" hangingPunct="1">
+                        <a:lnSpc>
+                          <a:spcPct val="100000"/>
+                        </a:lnSpc>
+                        <a:spcBef>
+                          <a:spcPts val="0"/>
+                        </a:spcBef>
+                        <a:spcAft>
+                          <a:spcPts val="0"/>
+                        </a:spcAft>
+                        <a:buClrTx/>
+                        <a:buSzTx/>
+                        <a:buFontTx/>
+                        <a:buNone/>
+                        <a:tabLst/>
+                        <a:defRPr/>
+                      </a:pPr>
+                      <a:endParaRPr lang="ko-KR" altLang="en-US" smtClean="0"/>
+                    </a:p>
+                  </a:txBody>
+                  <a:tcPr/>
+                </a:tc>
+                <a:tc>
+                  <a:txBody>
+                    <a:bodyPr/>
+                    <a:lstStyle/>
+                    <a:p>
+                      <a:pPr latinLnBrk="1"/>
+                      <a:r>
+                        <a:rPr lang="en-US" altLang="ko-KR" smtClean="0"/>
+                        <a:t>66666</a:t>
+                      </a:r>
+                      <a:endParaRPr lang="ko-KR" altLang="en-US"/>
+                    </a:p>
+                  </a:txBody>
+                  <a:tcPr/>
+                </a:tc>
+                <a:extLst>
+                  <a:ext uri="{0D108BD9-81ED-4DB2-BD59-A6C34878D82A}">
+                    <a16:rowId xmlns:a16="http://schemas.microsoft.com/office/drawing/2014/main" val="367104694"/>
+                  </a:ext>
+                </a:extLst>
+              </a:tr>
+              <a:tr h="370840">
+                <a:tc>
+                  <a:txBody>
+                    <a:bodyPr/>
+                    <a:lstStyle/>
+                    <a:p>
+                      <a:pPr marL="0" marR="0" indent="0" algn="l" defTabSz="914400" rtl="0" eaLnBrk="1" fontAlgn="auto" latinLnBrk="1" hangingPunct="1">
+                        <a:lnSpc>
+                          <a:spcPct val="100000"/>
+                        </a:lnSpc>
+                        <a:spcBef>
+                          <a:spcPts val="0"/>
+                        </a:spcBef>
+                        <a:spcAft>
+                          <a:spcPts val="0"/>
+                        </a:spcAft>
+                        <a:buClrTx/>
+                        <a:buSzTx/>
+                        <a:buFontTx/>
+                        <a:buNone/>
+                        <a:tabLst/>
+                        <a:defRPr/>
+                      </a:pPr>
+                      <a:endParaRPr lang="ko-KR" altLang="en-US" smtClean="0"/>
+                    </a:p>
+                  </a:txBody>
+                  <a:tcPr/>
+                </a:tc>
+                <a:tc>
+                  <a:txBody>
+                    <a:bodyPr/>
+                    <a:lstStyle/>
+                    <a:p>
+                      <a:pPr latinLnBrk="1"/>
+                      <a:r>
+                        <a:rPr lang="en-US" altLang="ko-KR" smtClean="0"/>
+                        <a:t>5555555</a:t>
+                      </a:r>
+                      <a:endParaRPr lang="ko-KR" altLang="en-US"/>
+                    </a:p>
+                  </a:txBody>
+                  <a:tcPr/>
+                </a:tc>
+                <a:extLst>
+                  <a:ext uri="{0D108BD9-81ED-4DB2-BD59-A6C34878D82A}">
+                    <a16:rowId xmlns:a16="http://schemas.microsoft.com/office/drawing/2014/main" val="2846041603"/>
+                  </a:ext>
+                </a:extLst>
+              </a:tr>
+            </a:tbl>
+          </a:graphicData>
+        </a:graphic>
+      </p:graphicFrame>
+      <p:sp>
+        <p:nvSpPr>
+          <p:cNvPr id="45" name="타원 44"/>
+          <p:cNvSpPr/>
+          <p:nvPr/>
+        </p:nvSpPr>
+        <p:spPr>
+          <a:xfrm>
+            <a:off x="9527808" y="2840151"/>
+            <a:ext cx="386385" cy="364689"/>
+          </a:xfrm>
+          <a:prstGeom prst="ellipse">
+            <a:avLst/>
+          </a:prstGeom>
+        </p:spPr>
+        <p:style>
+          <a:lnRef idx="2">
+            <a:schemeClr val="accent6">
+              <a:shade val="50000"/>
+            </a:schemeClr>
+          </a:lnRef>
+          <a:fillRef idx="1">
+            <a:schemeClr val="accent6"/>
+          </a:fillRef>
+          <a:effectRef idx="0">
+            <a:schemeClr val="accent6"/>
+          </a:effectRef>
+          <a:fontRef idx="minor">
+            <a:schemeClr val="lt1"/>
+          </a:fontRef>
+        </p:style>
+        <p:txBody>
+          <a:bodyPr rtlCol="0" anchor="ctr"/>
+          <a:lstStyle/>
+          <a:p>
+            <a:pPr algn="ctr"/>
+            <a:r>
+              <a:rPr lang="en-US" altLang="ko-KR" sz="900" smtClean="0"/>
+              <a:t>OK</a:t>
+            </a:r>
+            <a:endParaRPr lang="ko-KR" altLang="en-US" sz="900"/>
+          </a:p>
+        </p:txBody>
+      </p:sp>
+      <p:sp>
+        <p:nvSpPr>
+          <p:cNvPr id="50" name="타원 49"/>
+          <p:cNvSpPr/>
+          <p:nvPr/>
+        </p:nvSpPr>
+        <p:spPr>
+          <a:xfrm>
+            <a:off x="9527808" y="3230451"/>
+            <a:ext cx="386385" cy="364689"/>
+          </a:xfrm>
+          <a:prstGeom prst="ellipse">
+            <a:avLst/>
+          </a:prstGeom>
+          <a:solidFill>
+            <a:srgbClr val="C00000"/>
+          </a:solidFill>
+        </p:spPr>
+        <p:style>
+          <a:lnRef idx="2">
+            <a:schemeClr val="accent6">
+              <a:shade val="50000"/>
+            </a:schemeClr>
+          </a:lnRef>
+          <a:fillRef idx="1">
+            <a:schemeClr val="accent6"/>
+          </a:fillRef>
+          <a:effectRef idx="0">
+            <a:schemeClr val="accent6"/>
+          </a:effectRef>
+          <a:fontRef idx="minor">
+            <a:schemeClr val="lt1"/>
+          </a:fontRef>
+        </p:style>
+        <p:txBody>
+          <a:bodyPr rtlCol="0" anchor="ctr"/>
+          <a:lstStyle/>
+          <a:p>
+            <a:pPr algn="ctr"/>
+            <a:r>
+              <a:rPr lang="en-US" altLang="ko-KR" sz="900" smtClean="0"/>
+              <a:t>NG</a:t>
+            </a:r>
+            <a:endParaRPr lang="ko-KR" altLang="en-US" sz="900"/>
+          </a:p>
+        </p:txBody>
+      </p:sp>
+      <p:sp>
+        <p:nvSpPr>
+          <p:cNvPr id="51" name="타원 50"/>
+          <p:cNvSpPr/>
+          <p:nvPr/>
+        </p:nvSpPr>
+        <p:spPr>
+          <a:xfrm>
+            <a:off x="9527808" y="3650600"/>
+            <a:ext cx="386385" cy="364689"/>
+          </a:xfrm>
+          <a:prstGeom prst="ellipse">
+            <a:avLst/>
+          </a:prstGeom>
+        </p:spPr>
+        <p:style>
+          <a:lnRef idx="2">
+            <a:schemeClr val="accent6">
+              <a:shade val="50000"/>
+            </a:schemeClr>
+          </a:lnRef>
+          <a:fillRef idx="1">
+            <a:schemeClr val="accent6"/>
+          </a:fillRef>
+          <a:effectRef idx="0">
+            <a:schemeClr val="accent6"/>
+          </a:effectRef>
+          <a:fontRef idx="minor">
+            <a:schemeClr val="lt1"/>
+          </a:fontRef>
+        </p:style>
+        <p:txBody>
+          <a:bodyPr rtlCol="0" anchor="ctr"/>
+          <a:lstStyle/>
+          <a:p>
+            <a:pPr algn="ctr"/>
+            <a:r>
+              <a:rPr lang="en-US" altLang="ko-KR" sz="900" smtClean="0"/>
+              <a:t>OK</a:t>
+            </a:r>
+            <a:endParaRPr lang="ko-KR" altLang="en-US" sz="900"/>
+          </a:p>
+        </p:txBody>
+      </p:sp>
+      <p:sp>
+        <p:nvSpPr>
+          <p:cNvPr id="52" name="타원 51"/>
+          <p:cNvSpPr/>
+          <p:nvPr/>
+        </p:nvSpPr>
+        <p:spPr>
+          <a:xfrm>
+            <a:off x="9527808" y="4008131"/>
+            <a:ext cx="386385" cy="364689"/>
+          </a:xfrm>
+          <a:prstGeom prst="ellipse">
+            <a:avLst/>
+          </a:prstGeom>
+        </p:spPr>
+        <p:style>
+          <a:lnRef idx="2">
+            <a:schemeClr val="accent6">
+              <a:shade val="50000"/>
+            </a:schemeClr>
+          </a:lnRef>
+          <a:fillRef idx="1">
+            <a:schemeClr val="accent6"/>
+          </a:fillRef>
+          <a:effectRef idx="0">
+            <a:schemeClr val="accent6"/>
+          </a:effectRef>
+          <a:fontRef idx="minor">
+            <a:schemeClr val="lt1"/>
+          </a:fontRef>
+        </p:style>
+        <p:txBody>
+          <a:bodyPr rtlCol="0" anchor="ctr"/>
+          <a:lstStyle/>
+          <a:p>
+            <a:pPr algn="ctr"/>
+            <a:r>
+              <a:rPr lang="en-US" altLang="ko-KR" sz="900" smtClean="0"/>
+              <a:t>OK</a:t>
+            </a:r>
+            <a:endParaRPr lang="ko-KR" altLang="en-US" sz="900"/>
+          </a:p>
+        </p:txBody>
+      </p:sp>
+      <p:sp>
+        <p:nvSpPr>
+          <p:cNvPr id="53" name="타원 52"/>
+          <p:cNvSpPr/>
+          <p:nvPr/>
+        </p:nvSpPr>
+        <p:spPr>
+          <a:xfrm>
+            <a:off x="9527808" y="4389631"/>
+            <a:ext cx="386385" cy="364689"/>
+          </a:xfrm>
+          <a:prstGeom prst="ellipse">
+            <a:avLst/>
+          </a:prstGeom>
+        </p:spPr>
+        <p:style>
+          <a:lnRef idx="2">
+            <a:schemeClr val="accent6">
+              <a:shade val="50000"/>
+            </a:schemeClr>
+          </a:lnRef>
+          <a:fillRef idx="1">
+            <a:schemeClr val="accent6"/>
+          </a:fillRef>
+          <a:effectRef idx="0">
+            <a:schemeClr val="accent6"/>
+          </a:effectRef>
+          <a:fontRef idx="minor">
+            <a:schemeClr val="lt1"/>
+          </a:fontRef>
+        </p:style>
+        <p:txBody>
+          <a:bodyPr rtlCol="0" anchor="ctr"/>
+          <a:lstStyle/>
+          <a:p>
+            <a:pPr algn="ctr"/>
+            <a:r>
+              <a:rPr lang="en-US" altLang="ko-KR" sz="900" smtClean="0"/>
+              <a:t>OK</a:t>
+            </a:r>
+            <a:endParaRPr lang="ko-KR" altLang="en-US" sz="900"/>
+          </a:p>
+        </p:txBody>
+      </p:sp>
+      <p:sp>
+        <p:nvSpPr>
+          <p:cNvPr id="54" name="모서리가 둥근 직사각형 53"/>
+          <p:cNvSpPr/>
+          <p:nvPr/>
+        </p:nvSpPr>
+        <p:spPr>
+          <a:xfrm>
+            <a:off x="2127995" y="7639586"/>
+            <a:ext cx="1455681" cy="502240"/>
+          </a:xfrm>
+          <a:prstGeom prst="roundRect">
+            <a:avLst>
+              <a:gd name="adj" fmla="val 14444"/>
+            </a:avLst>
+          </a:prstGeom>
+          <a:ln/>
+        </p:spPr>
+        <p:style>
+          <a:lnRef idx="2">
+            <a:schemeClr val="accent5"/>
+          </a:lnRef>
+          <a:fillRef idx="1">
+            <a:schemeClr val="lt1"/>
+          </a:fillRef>
+          <a:effectRef idx="0">
+            <a:schemeClr val="accent5"/>
+          </a:effectRef>
+          <a:fontRef idx="minor">
+            <a:schemeClr val="dk1"/>
+          </a:fontRef>
+        </p:style>
+        <p:txBody>
+          <a:bodyPr rot="0" spcFirstLastPara="0" vertOverflow="overflow" horzOverflow="overflow" vert="horz" wrap="square" lIns="91440" tIns="45720" rIns="91440" bIns="45720" numCol="1" spcCol="0" rtlCol="0" fromWordArt="0" anchor="ctr" anchorCtr="0" forceAA="0" compatLnSpc="1">
+            <a:prstTxWarp prst="textNoShape">
+              <a:avLst/>
+            </a:prstTxWarp>
+            <a:noAutofit/>
+          </a:bodyPr>
+          <a:lstStyle/>
+          <a:p>
+            <a:pPr algn="ctr"/>
+            <a:r>
+              <a:rPr lang="en-US" altLang="ko-KR" sz="1400" smtClean="0">
+                <a:latin typeface="Consolas" panose="020B0609020204030204" pitchFamily="49" charset="0"/>
+              </a:rPr>
+              <a:t>FRONT /LH</a:t>
+            </a:r>
+          </a:p>
+          <a:p>
+            <a:pPr algn="ctr"/>
+            <a:r>
+              <a:rPr lang="en-US" altLang="ko-KR" sz="1400" smtClean="0">
+                <a:latin typeface="Consolas" panose="020B0609020204030204" pitchFamily="49" charset="0"/>
+              </a:rPr>
+              <a:t> </a:t>
+            </a:r>
+            <a:r>
+              <a:rPr lang="ko-KR" altLang="en-US" sz="1400" smtClean="0">
+                <a:latin typeface="Consolas" panose="020B0609020204030204" pitchFamily="49" charset="0"/>
+              </a:rPr>
+              <a:t>당일누적수량</a:t>
+            </a:r>
+            <a:endParaRPr lang="ko-KR" altLang="en-US" sz="1400">
+              <a:latin typeface="Consolas" panose="020B0609020204030204" pitchFamily="49" charset="0"/>
+            </a:endParaRPr>
+          </a:p>
+        </p:txBody>
+      </p:sp>
+      <p:sp>
+        <p:nvSpPr>
+          <p:cNvPr id="56" name="모서리가 둥근 직사각형 55"/>
+          <p:cNvSpPr/>
+          <p:nvPr/>
+        </p:nvSpPr>
+        <p:spPr>
+          <a:xfrm>
+            <a:off x="6618758" y="7651909"/>
+            <a:ext cx="1455681" cy="502240"/>
+          </a:xfrm>
+          <a:prstGeom prst="roundRect">
+            <a:avLst>
+              <a:gd name="adj" fmla="val 14444"/>
+            </a:avLst>
+          </a:prstGeom>
+          <a:ln/>
+        </p:spPr>
+        <p:style>
+          <a:lnRef idx="2">
+            <a:schemeClr val="accent5"/>
+          </a:lnRef>
+          <a:fillRef idx="1">
+            <a:schemeClr val="lt1"/>
+          </a:fillRef>
+          <a:effectRef idx="0">
+            <a:schemeClr val="accent5"/>
+          </a:effectRef>
+          <a:fontRef idx="minor">
+            <a:schemeClr val="dk1"/>
+          </a:fontRef>
+        </p:style>
+        <p:txBody>
+          <a:bodyPr rot="0" spcFirstLastPara="0" vertOverflow="overflow" horzOverflow="overflow" vert="horz" wrap="square" lIns="91440" tIns="45720" rIns="91440" bIns="45720" numCol="1" spcCol="0" rtlCol="0" fromWordArt="0" anchor="ctr" anchorCtr="0" forceAA="0" compatLnSpc="1">
+            <a:prstTxWarp prst="textNoShape">
+              <a:avLst/>
+            </a:prstTxWarp>
+            <a:noAutofit/>
+          </a:bodyPr>
+          <a:lstStyle/>
+          <a:p>
+            <a:pPr algn="ctr"/>
+            <a:r>
+              <a:rPr lang="en-US" altLang="ko-KR" sz="1400" smtClean="0">
+                <a:latin typeface="Consolas" panose="020B0609020204030204" pitchFamily="49" charset="0"/>
+              </a:rPr>
+              <a:t>REAR / RH</a:t>
+            </a:r>
+          </a:p>
+          <a:p>
+            <a:pPr algn="ctr"/>
+            <a:r>
+              <a:rPr lang="ko-KR" altLang="en-US" sz="1400" smtClean="0">
+                <a:latin typeface="Consolas" panose="020B0609020204030204" pitchFamily="49" charset="0"/>
+              </a:rPr>
+              <a:t>당일</a:t>
+            </a:r>
+            <a:r>
+              <a:rPr lang="en-US" altLang="ko-KR" sz="1400" smtClean="0">
+                <a:latin typeface="Consolas" panose="020B0609020204030204" pitchFamily="49" charset="0"/>
+              </a:rPr>
+              <a:t> </a:t>
+            </a:r>
+            <a:r>
+              <a:rPr lang="ko-KR" altLang="en-US" sz="1400" smtClean="0">
+                <a:latin typeface="Consolas" panose="020B0609020204030204" pitchFamily="49" charset="0"/>
+              </a:rPr>
+              <a:t>누적수량</a:t>
+            </a:r>
+            <a:endParaRPr lang="ko-KR" altLang="en-US" sz="1400">
+              <a:latin typeface="Consolas" panose="020B0609020204030204" pitchFamily="49" charset="0"/>
+            </a:endParaRPr>
+          </a:p>
+        </p:txBody>
+      </p:sp>
+      <p:sp>
+        <p:nvSpPr>
+          <p:cNvPr id="57" name="모서리가 둥근 직사각형 56"/>
+          <p:cNvSpPr/>
+          <p:nvPr/>
+        </p:nvSpPr>
+        <p:spPr>
+          <a:xfrm>
+            <a:off x="2127995" y="7008159"/>
+            <a:ext cx="1455681" cy="502240"/>
+          </a:xfrm>
+          <a:prstGeom prst="roundRect">
+            <a:avLst>
+              <a:gd name="adj" fmla="val 14444"/>
+            </a:avLst>
+          </a:prstGeom>
+          <a:ln/>
+        </p:spPr>
+        <p:style>
+          <a:lnRef idx="2">
+            <a:schemeClr val="accent5"/>
+          </a:lnRef>
+          <a:fillRef idx="1">
+            <a:schemeClr val="lt1"/>
+          </a:fillRef>
+          <a:effectRef idx="0">
+            <a:schemeClr val="accent5"/>
+          </a:effectRef>
+          <a:fontRef idx="minor">
+            <a:schemeClr val="dk1"/>
+          </a:fontRef>
+        </p:style>
+        <p:txBody>
+          <a:bodyPr rot="0" spcFirstLastPara="0" vertOverflow="overflow" horzOverflow="overflow" vert="horz" wrap="square" lIns="91440" tIns="45720" rIns="91440" bIns="45720" numCol="1" spcCol="0" rtlCol="0" fromWordArt="0" anchor="ctr" anchorCtr="0" forceAA="0" compatLnSpc="1">
+            <a:prstTxWarp prst="textNoShape">
+              <a:avLst/>
+            </a:prstTxWarp>
+            <a:noAutofit/>
+          </a:bodyPr>
+          <a:lstStyle/>
+          <a:p>
+            <a:pPr algn="ctr"/>
+            <a:r>
+              <a:rPr lang="en-US" altLang="ko-KR" sz="1400" smtClean="0">
+                <a:latin typeface="Consolas" panose="020B0609020204030204" pitchFamily="49" charset="0"/>
+              </a:rPr>
+              <a:t>FRONT /LH</a:t>
+            </a:r>
+          </a:p>
+          <a:p>
+            <a:pPr algn="ctr"/>
+            <a:r>
+              <a:rPr lang="en-US" altLang="ko-KR" sz="1400" smtClean="0">
+                <a:latin typeface="Consolas" panose="020B0609020204030204" pitchFamily="49" charset="0"/>
+              </a:rPr>
+              <a:t> </a:t>
+            </a:r>
+            <a:r>
+              <a:rPr lang="ko-KR" altLang="en-US" sz="1400" smtClean="0">
+                <a:latin typeface="Consolas" panose="020B0609020204030204" pitchFamily="49" charset="0"/>
+              </a:rPr>
+              <a:t>해당공정</a:t>
+            </a:r>
+            <a:endParaRPr lang="en-US" altLang="ko-KR" sz="1400" smtClean="0">
+              <a:latin typeface="Consolas" panose="020B0609020204030204" pitchFamily="49" charset="0"/>
+            </a:endParaRPr>
+          </a:p>
+          <a:p>
+            <a:pPr algn="ctr"/>
+            <a:r>
+              <a:rPr lang="ko-KR" altLang="en-US" sz="1400" smtClean="0">
+                <a:latin typeface="Consolas" panose="020B0609020204030204" pitchFamily="49" charset="0"/>
+              </a:rPr>
+              <a:t>작업수량</a:t>
+            </a:r>
+            <a:endParaRPr lang="ko-KR" altLang="en-US" sz="1400">
+              <a:latin typeface="Consolas" panose="020B0609020204030204" pitchFamily="49" charset="0"/>
+            </a:endParaRPr>
+          </a:p>
+        </p:txBody>
+      </p:sp>
+      <p:sp>
+        <p:nvSpPr>
+          <p:cNvPr id="58" name="모서리가 둥근 직사각형 57"/>
+          <p:cNvSpPr/>
+          <p:nvPr/>
+        </p:nvSpPr>
+        <p:spPr>
+          <a:xfrm>
+            <a:off x="6618758" y="7020482"/>
+            <a:ext cx="1455681" cy="502240"/>
+          </a:xfrm>
+          <a:prstGeom prst="roundRect">
+            <a:avLst>
+              <a:gd name="adj" fmla="val 14444"/>
+            </a:avLst>
+          </a:prstGeom>
+          <a:ln/>
+        </p:spPr>
+        <p:style>
+          <a:lnRef idx="2">
+            <a:schemeClr val="accent5"/>
+          </a:lnRef>
+          <a:fillRef idx="1">
+            <a:schemeClr val="lt1"/>
+          </a:fillRef>
+          <a:effectRef idx="0">
+            <a:schemeClr val="accent5"/>
+          </a:effectRef>
+          <a:fontRef idx="minor">
+            <a:schemeClr val="dk1"/>
+          </a:fontRef>
+        </p:style>
+        <p:txBody>
+          <a:bodyPr rot="0" spcFirstLastPara="0" vertOverflow="overflow" horzOverflow="overflow" vert="horz" wrap="square" lIns="91440" tIns="45720" rIns="91440" bIns="45720" numCol="1" spcCol="0" rtlCol="0" fromWordArt="0" anchor="ctr" anchorCtr="0" forceAA="0" compatLnSpc="1">
+            <a:prstTxWarp prst="textNoShape">
+              <a:avLst/>
+            </a:prstTxWarp>
+            <a:noAutofit/>
+          </a:bodyPr>
+          <a:lstStyle/>
+          <a:p>
+            <a:pPr algn="ctr"/>
+            <a:r>
+              <a:rPr lang="en-US" altLang="ko-KR" sz="1400" smtClean="0">
+                <a:latin typeface="Consolas" panose="020B0609020204030204" pitchFamily="49" charset="0"/>
+              </a:rPr>
+              <a:t>REAR / RH</a:t>
+            </a:r>
+          </a:p>
+          <a:p>
+            <a:pPr algn="ctr"/>
+            <a:r>
+              <a:rPr lang="ko-KR" altLang="en-US" sz="1400" smtClean="0">
+                <a:latin typeface="Consolas" panose="020B0609020204030204" pitchFamily="49" charset="0"/>
+              </a:rPr>
+              <a:t>해당공정</a:t>
+            </a:r>
+            <a:endParaRPr lang="en-US" altLang="ko-KR" sz="1400" smtClean="0">
+              <a:latin typeface="Consolas" panose="020B0609020204030204" pitchFamily="49" charset="0"/>
+            </a:endParaRPr>
+          </a:p>
+          <a:p>
+            <a:pPr algn="ctr"/>
+            <a:r>
+              <a:rPr lang="ko-KR" altLang="en-US" sz="1400" smtClean="0">
+                <a:latin typeface="Consolas" panose="020B0609020204030204" pitchFamily="49" charset="0"/>
+              </a:rPr>
+              <a:t>작업수량</a:t>
+            </a:r>
+            <a:endParaRPr lang="ko-KR" altLang="en-US" sz="1400">
+              <a:latin typeface="Consolas" panose="020B0609020204030204" pitchFamily="49" charset="0"/>
+            </a:endParaRPr>
+          </a:p>
+        </p:txBody>
+      </p:sp>
+      <p:sp>
+        <p:nvSpPr>
+          <p:cNvPr id="59" name="모서리가 둥근 직사각형 58"/>
+          <p:cNvSpPr/>
+          <p:nvPr/>
+        </p:nvSpPr>
+        <p:spPr>
+          <a:xfrm>
+            <a:off x="206569" y="3522619"/>
+            <a:ext cx="988601" cy="1938314"/>
+          </a:xfrm>
+          <a:prstGeom prst="roundRect">
+            <a:avLst>
+              <a:gd name="adj" fmla="val 4422"/>
+            </a:avLst>
+          </a:prstGeom>
+          <a:noFill/>
+        </p:spPr>
+        <p:style>
+          <a:lnRef idx="2">
+            <a:schemeClr val="accent1">
+              <a:shade val="50000"/>
+            </a:schemeClr>
+          </a:lnRef>
+          <a:fillRef idx="1">
+            <a:schemeClr val="accent1"/>
+          </a:fillRef>
+          <a:effectRef idx="0">
+            <a:schemeClr val="accent1"/>
+          </a:effectRef>
+          <a:fontRef idx="minor">
+            <a:schemeClr val="lt1"/>
+          </a:fontRef>
+        </p:style>
+        <p:txBody>
+          <a:bodyPr rot="0" spcFirstLastPara="0" vertOverflow="overflow" horzOverflow="overflow" vert="horz" wrap="square" lIns="91440" tIns="45720" rIns="91440" bIns="45720" numCol="1" spcCol="0" rtlCol="0" fromWordArt="0" anchor="ctr" anchorCtr="0" forceAA="0" compatLnSpc="1">
+            <a:prstTxWarp prst="textNoShape">
+              <a:avLst/>
+            </a:prstTxWarp>
+            <a:noAutofit/>
+          </a:bodyPr>
+          <a:lstStyle/>
+          <a:p>
+            <a:pPr algn="ctr"/>
+            <a:endParaRPr lang="ko-KR" altLang="en-US" sz="8000">
+              <a:latin typeface="Consolas" panose="020B0609020204030204" pitchFamily="49" charset="0"/>
+            </a:endParaRPr>
+          </a:p>
+        </p:txBody>
+      </p:sp>
+      <p:sp>
+        <p:nvSpPr>
+          <p:cNvPr id="60" name="모서리가 둥근 직사각형 59"/>
+          <p:cNvSpPr/>
+          <p:nvPr/>
+        </p:nvSpPr>
+        <p:spPr>
+          <a:xfrm>
+            <a:off x="4909459" y="3478183"/>
+            <a:ext cx="988601" cy="1938314"/>
+          </a:xfrm>
+          <a:prstGeom prst="roundRect">
+            <a:avLst>
+              <a:gd name="adj" fmla="val 4422"/>
+            </a:avLst>
+          </a:prstGeom>
+          <a:noFill/>
+        </p:spPr>
+        <p:style>
+          <a:lnRef idx="2">
+            <a:schemeClr val="accent1">
+              <a:shade val="50000"/>
+            </a:schemeClr>
+          </a:lnRef>
+          <a:fillRef idx="1">
+            <a:schemeClr val="accent1"/>
+          </a:fillRef>
+          <a:effectRef idx="0">
+            <a:schemeClr val="accent1"/>
+          </a:effectRef>
+          <a:fontRef idx="minor">
+            <a:schemeClr val="lt1"/>
+          </a:fontRef>
+        </p:style>
+        <p:txBody>
+          <a:bodyPr rot="0" spcFirstLastPara="0" vertOverflow="overflow" horzOverflow="overflow" vert="horz" wrap="square" lIns="91440" tIns="45720" rIns="91440" bIns="45720" numCol="1" spcCol="0" rtlCol="0" fromWordArt="0" anchor="ctr" anchorCtr="0" forceAA="0" compatLnSpc="1">
+            <a:prstTxWarp prst="textNoShape">
+              <a:avLst/>
+            </a:prstTxWarp>
+            <a:noAutofit/>
+          </a:bodyPr>
+          <a:lstStyle/>
+          <a:p>
+            <a:pPr algn="ctr"/>
+            <a:endParaRPr lang="ko-KR" altLang="en-US" sz="8000">
+              <a:latin typeface="Consolas" panose="020B0609020204030204" pitchFamily="49" charset="0"/>
+            </a:endParaRPr>
+          </a:p>
+        </p:txBody>
+      </p:sp>
+      <p:sp>
+        <p:nvSpPr>
+          <p:cNvPr id="61" name="모서리가 둥근 직사각형 60"/>
+          <p:cNvSpPr/>
+          <p:nvPr/>
+        </p:nvSpPr>
+        <p:spPr>
+          <a:xfrm>
+            <a:off x="1288249" y="3545728"/>
+            <a:ext cx="669898" cy="362661"/>
+          </a:xfrm>
+          <a:prstGeom prst="roundRect">
+            <a:avLst>
+              <a:gd name="adj" fmla="val 4422"/>
+            </a:avLst>
+          </a:prstGeom>
+          <a:solidFill>
+            <a:schemeClr val="accent5">
+              <a:lumMod val="40000"/>
+              <a:lumOff val="60000"/>
+            </a:schemeClr>
+          </a:solidFill>
+        </p:spPr>
+        <p:style>
+          <a:lnRef idx="2">
+            <a:schemeClr val="accent4">
+              <a:shade val="50000"/>
+            </a:schemeClr>
+          </a:lnRef>
+          <a:fillRef idx="1">
+            <a:schemeClr val="accent4"/>
+          </a:fillRef>
+          <a:effectRef idx="0">
+            <a:schemeClr val="accent4"/>
+          </a:effectRef>
+          <a:fontRef idx="minor">
+            <a:schemeClr val="lt1"/>
+          </a:fontRef>
+        </p:style>
+        <p:txBody>
+          <a:bodyPr rot="0" spcFirstLastPara="0" vertOverflow="overflow" horzOverflow="overflow" vert="horz" wrap="square" lIns="91440" tIns="45720" rIns="91440" bIns="45720" numCol="1" spcCol="0" rtlCol="0" fromWordArt="0" anchor="ctr" anchorCtr="0" forceAA="0" compatLnSpc="1">
+            <a:prstTxWarp prst="textNoShape">
+              <a:avLst/>
+            </a:prstTxWarp>
+            <a:noAutofit/>
+          </a:bodyPr>
+          <a:lstStyle/>
+          <a:p>
+            <a:pPr algn="ctr"/>
+            <a:r>
+              <a:rPr lang="en-US" altLang="ko-KR" sz="1400" b="1" smtClean="0">
+                <a:solidFill>
+                  <a:srgbClr val="002060"/>
+                </a:solidFill>
+                <a:latin typeface="Consolas" panose="020B0609020204030204" pitchFamily="49" charset="0"/>
+              </a:rPr>
+              <a:t>UPH</a:t>
+            </a:r>
+            <a:endParaRPr lang="ko-KR" altLang="en-US" sz="1400" b="1">
+              <a:solidFill>
+                <a:srgbClr val="002060"/>
+              </a:solidFill>
+              <a:latin typeface="Consolas" panose="020B0609020204030204" pitchFamily="49" charset="0"/>
+            </a:endParaRPr>
+          </a:p>
+        </p:txBody>
+      </p:sp>
+      <p:sp>
+        <p:nvSpPr>
+          <p:cNvPr id="62" name="모서리가 둥근 직사각형 61"/>
+          <p:cNvSpPr/>
+          <p:nvPr/>
+        </p:nvSpPr>
+        <p:spPr>
+          <a:xfrm>
+            <a:off x="5991139" y="3501292"/>
+            <a:ext cx="669898" cy="362661"/>
+          </a:xfrm>
+          <a:prstGeom prst="roundRect">
+            <a:avLst>
+              <a:gd name="adj" fmla="val 4422"/>
+            </a:avLst>
+          </a:prstGeom>
+          <a:solidFill>
+            <a:schemeClr val="accent5">
+              <a:lumMod val="40000"/>
+              <a:lumOff val="60000"/>
+            </a:schemeClr>
+          </a:solidFill>
+        </p:spPr>
+        <p:style>
+          <a:lnRef idx="2">
+            <a:schemeClr val="accent4">
+              <a:shade val="50000"/>
+            </a:schemeClr>
+          </a:lnRef>
+          <a:fillRef idx="1">
+            <a:schemeClr val="accent4"/>
+          </a:fillRef>
+          <a:effectRef idx="0">
+            <a:schemeClr val="accent4"/>
+          </a:effectRef>
+          <a:fontRef idx="minor">
+            <a:schemeClr val="lt1"/>
+          </a:fontRef>
+        </p:style>
+        <p:txBody>
+          <a:bodyPr rot="0" spcFirstLastPara="0" vertOverflow="overflow" horzOverflow="overflow" vert="horz" wrap="square" lIns="91440" tIns="45720" rIns="91440" bIns="45720" numCol="1" spcCol="0" rtlCol="0" fromWordArt="0" anchor="ctr" anchorCtr="0" forceAA="0" compatLnSpc="1">
+            <a:prstTxWarp prst="textNoShape">
+              <a:avLst/>
+            </a:prstTxWarp>
+            <a:noAutofit/>
+          </a:bodyPr>
+          <a:lstStyle/>
+          <a:p>
+            <a:pPr algn="ctr"/>
+            <a:r>
+              <a:rPr lang="en-US" altLang="ko-KR" sz="1400" b="1" smtClean="0">
+                <a:solidFill>
+                  <a:srgbClr val="002060"/>
+                </a:solidFill>
+                <a:latin typeface="Consolas" panose="020B0609020204030204" pitchFamily="49" charset="0"/>
+              </a:rPr>
+              <a:t>UPH</a:t>
+            </a:r>
+            <a:endParaRPr lang="ko-KR" altLang="en-US" sz="1400" b="1">
+              <a:solidFill>
+                <a:srgbClr val="002060"/>
+              </a:solidFill>
+              <a:latin typeface="Consolas" panose="020B0609020204030204" pitchFamily="49" charset="0"/>
+            </a:endParaRPr>
           </a:p>
         </p:txBody>
       </p:sp>
@@ -3401,6 +5995,13 @@
   <p:clrMapOvr>
     <a:masterClrMapping/>
   </p:clrMapOvr>
+  <p:timing>
+    <p:tnLst>
+      <p:par>
+        <p:cTn id="1" dur="indefinite" restart="never" nodeType="tmRoot"/>
+      </p:par>
+    </p:tnLst>
+  </p:timing>
 </p:sld>
 </file>
 

</xml_diff>